<commit_message>
Ajout de nouvelle consignes sur le ppt
</commit_message>
<xml_diff>
--- a/tâches_à_effectuer.pptx
+++ b/tâches_à_effectuer.pptx
@@ -8,6 +8,16 @@
     <p:sldId id="256" r:id="rId2"/>
     <p:sldId id="257" r:id="rId3"/>
     <p:sldId id="258" r:id="rId4"/>
+    <p:sldId id="267" r:id="rId5"/>
+    <p:sldId id="259" r:id="rId6"/>
+    <p:sldId id="261" r:id="rId7"/>
+    <p:sldId id="262" r:id="rId8"/>
+    <p:sldId id="263" r:id="rId9"/>
+    <p:sldId id="264" r:id="rId10"/>
+    <p:sldId id="265" r:id="rId11"/>
+    <p:sldId id="266" r:id="rId12"/>
+    <p:sldId id="268" r:id="rId13"/>
+    <p:sldId id="269" r:id="rId14"/>
   </p:sldIdLst>
   <p:sldSz cx="12192000" cy="6858000"/>
   <p:notesSz cx="6858000" cy="9144000"/>
@@ -261,7 +271,7 @@
           <a:p>
             <a:fld id="{2663041B-0D2C-480E-9AE9-B7D3AC2DC4E7}" type="datetimeFigureOut">
               <a:rPr lang="fr-FR" smtClean="0"/>
-              <a:t>19/02/2024</a:t>
+              <a:t>03/03/2024</a:t>
             </a:fld>
             <a:endParaRPr lang="fr-FR"/>
           </a:p>
@@ -459,7 +469,7 @@
           <a:p>
             <a:fld id="{2663041B-0D2C-480E-9AE9-B7D3AC2DC4E7}" type="datetimeFigureOut">
               <a:rPr lang="fr-FR" smtClean="0"/>
-              <a:t>19/02/2024</a:t>
+              <a:t>03/03/2024</a:t>
             </a:fld>
             <a:endParaRPr lang="fr-FR"/>
           </a:p>
@@ -667,7 +677,7 @@
           <a:p>
             <a:fld id="{2663041B-0D2C-480E-9AE9-B7D3AC2DC4E7}" type="datetimeFigureOut">
               <a:rPr lang="fr-FR" smtClean="0"/>
-              <a:t>19/02/2024</a:t>
+              <a:t>03/03/2024</a:t>
             </a:fld>
             <a:endParaRPr lang="fr-FR"/>
           </a:p>
@@ -865,7 +875,7 @@
           <a:p>
             <a:fld id="{2663041B-0D2C-480E-9AE9-B7D3AC2DC4E7}" type="datetimeFigureOut">
               <a:rPr lang="fr-FR" smtClean="0"/>
-              <a:t>19/02/2024</a:t>
+              <a:t>03/03/2024</a:t>
             </a:fld>
             <a:endParaRPr lang="fr-FR"/>
           </a:p>
@@ -1140,7 +1150,7 @@
           <a:p>
             <a:fld id="{2663041B-0D2C-480E-9AE9-B7D3AC2DC4E7}" type="datetimeFigureOut">
               <a:rPr lang="fr-FR" smtClean="0"/>
-              <a:t>19/02/2024</a:t>
+              <a:t>03/03/2024</a:t>
             </a:fld>
             <a:endParaRPr lang="fr-FR"/>
           </a:p>
@@ -1405,7 +1415,7 @@
           <a:p>
             <a:fld id="{2663041B-0D2C-480E-9AE9-B7D3AC2DC4E7}" type="datetimeFigureOut">
               <a:rPr lang="fr-FR" smtClean="0"/>
-              <a:t>19/02/2024</a:t>
+              <a:t>03/03/2024</a:t>
             </a:fld>
             <a:endParaRPr lang="fr-FR"/>
           </a:p>
@@ -1817,7 +1827,7 @@
           <a:p>
             <a:fld id="{2663041B-0D2C-480E-9AE9-B7D3AC2DC4E7}" type="datetimeFigureOut">
               <a:rPr lang="fr-FR" smtClean="0"/>
-              <a:t>19/02/2024</a:t>
+              <a:t>03/03/2024</a:t>
             </a:fld>
             <a:endParaRPr lang="fr-FR"/>
           </a:p>
@@ -1958,7 +1968,7 @@
           <a:p>
             <a:fld id="{2663041B-0D2C-480E-9AE9-B7D3AC2DC4E7}" type="datetimeFigureOut">
               <a:rPr lang="fr-FR" smtClean="0"/>
-              <a:t>19/02/2024</a:t>
+              <a:t>03/03/2024</a:t>
             </a:fld>
             <a:endParaRPr lang="fr-FR"/>
           </a:p>
@@ -2071,7 +2081,7 @@
           <a:p>
             <a:fld id="{2663041B-0D2C-480E-9AE9-B7D3AC2DC4E7}" type="datetimeFigureOut">
               <a:rPr lang="fr-FR" smtClean="0"/>
-              <a:t>19/02/2024</a:t>
+              <a:t>03/03/2024</a:t>
             </a:fld>
             <a:endParaRPr lang="fr-FR"/>
           </a:p>
@@ -2382,7 +2392,7 @@
           <a:p>
             <a:fld id="{2663041B-0D2C-480E-9AE9-B7D3AC2DC4E7}" type="datetimeFigureOut">
               <a:rPr lang="fr-FR" smtClean="0"/>
-              <a:t>19/02/2024</a:t>
+              <a:t>03/03/2024</a:t>
             </a:fld>
             <a:endParaRPr lang="fr-FR"/>
           </a:p>
@@ -2670,7 +2680,7 @@
           <a:p>
             <a:fld id="{2663041B-0D2C-480E-9AE9-B7D3AC2DC4E7}" type="datetimeFigureOut">
               <a:rPr lang="fr-FR" smtClean="0"/>
-              <a:t>19/02/2024</a:t>
+              <a:t>03/03/2024</a:t>
             </a:fld>
             <a:endParaRPr lang="fr-FR"/>
           </a:p>
@@ -2911,7 +2921,7 @@
           <a:p>
             <a:fld id="{2663041B-0D2C-480E-9AE9-B7D3AC2DC4E7}" type="datetimeFigureOut">
               <a:rPr lang="fr-FR" smtClean="0"/>
-              <a:t>19/02/2024</a:t>
+              <a:t>03/03/2024</a:t>
             </a:fld>
             <a:endParaRPr lang="fr-FR"/>
           </a:p>
@@ -3570,6 +3580,1460 @@
     <p:extLst>
       <p:ext uri="{BB962C8B-B14F-4D97-AF65-F5344CB8AC3E}">
         <p14:creationId xmlns:p14="http://schemas.microsoft.com/office/powerpoint/2010/main" val="643893894"/>
+      </p:ext>
+    </p:extLst>
+  </p:cSld>
+  <p:clrMapOvr>
+    <a:masterClrMapping/>
+  </p:clrMapOvr>
+</p:sld>
+</file>
+
+<file path=ppt/slides/slide10.xml><?xml version="1.0" encoding="utf-8"?>
+<p:sld xmlns:a="http://schemas.openxmlformats.org/drawingml/2006/main" xmlns:r="http://schemas.openxmlformats.org/officeDocument/2006/relationships" xmlns:p="http://schemas.openxmlformats.org/presentationml/2006/main">
+  <p:cSld>
+    <p:spTree>
+      <p:nvGrpSpPr>
+        <p:cNvPr id="1" name=""/>
+        <p:cNvGrpSpPr/>
+        <p:nvPr/>
+      </p:nvGrpSpPr>
+      <p:grpSpPr>
+        <a:xfrm>
+          <a:off x="0" y="0"/>
+          <a:ext cx="0" cy="0"/>
+          <a:chOff x="0" y="0"/>
+          <a:chExt cx="0" cy="0"/>
+        </a:xfrm>
+      </p:grpSpPr>
+      <p:sp>
+        <p:nvSpPr>
+          <p:cNvPr id="4" name="Rectangle 3">
+            <a:extLst>
+              <a:ext uri="{FF2B5EF4-FFF2-40B4-BE49-F238E27FC236}">
+                <a16:creationId xmlns:a16="http://schemas.microsoft.com/office/drawing/2014/main" id="{F74F66EE-F1ED-5B5B-FA6A-4DD69D1F9CE1}"/>
+              </a:ext>
+            </a:extLst>
+          </p:cNvPr>
+          <p:cNvSpPr/>
+          <p:nvPr/>
+        </p:nvSpPr>
+        <p:spPr>
+          <a:xfrm>
+            <a:off x="3267075" y="190500"/>
+            <a:ext cx="5829300" cy="914400"/>
+          </a:xfrm>
+          <a:prstGeom prst="rect">
+            <a:avLst/>
+          </a:prstGeom>
+          <a:noFill/>
+        </p:spPr>
+        <p:style>
+          <a:lnRef idx="2">
+            <a:schemeClr val="accent1">
+              <a:shade val="15000"/>
+            </a:schemeClr>
+          </a:lnRef>
+          <a:fillRef idx="1">
+            <a:schemeClr val="accent1"/>
+          </a:fillRef>
+          <a:effectRef idx="0">
+            <a:schemeClr val="accent1"/>
+          </a:effectRef>
+          <a:fontRef idx="minor">
+            <a:schemeClr val="lt1"/>
+          </a:fontRef>
+        </p:style>
+        <p:txBody>
+          <a:bodyPr rtlCol="0" anchor="ctr"/>
+          <a:lstStyle/>
+          <a:p>
+            <a:pPr algn="ctr"/>
+            <a:r>
+              <a:rPr lang="fr-FR" sz="2800" dirty="0">
+                <a:solidFill>
+                  <a:schemeClr val="tx1"/>
+                </a:solidFill>
+                <a:latin typeface="Calibri" panose="020F0502020204030204" pitchFamily="34" charset="0"/>
+                <a:cs typeface="Calibri" panose="020F0502020204030204" pitchFamily="34" charset="0"/>
+              </a:rPr>
+              <a:t>Meilleurs passeurs décisifs de 2018</a:t>
+            </a:r>
+          </a:p>
+        </p:txBody>
+      </p:sp>
+      <p:pic>
+        <p:nvPicPr>
+          <p:cNvPr id="6" name="Image 5">
+            <a:extLst>
+              <a:ext uri="{FF2B5EF4-FFF2-40B4-BE49-F238E27FC236}">
+                <a16:creationId xmlns:a16="http://schemas.microsoft.com/office/drawing/2014/main" id="{1523ECA5-F6C9-E793-38D8-3603E6FD0837}"/>
+              </a:ext>
+            </a:extLst>
+          </p:cNvPr>
+          <p:cNvPicPr>
+            <a:picLocks noChangeAspect="1"/>
+          </p:cNvPicPr>
+          <p:nvPr/>
+        </p:nvPicPr>
+        <p:blipFill>
+          <a:blip r:embed="rId2"/>
+          <a:stretch>
+            <a:fillRect/>
+          </a:stretch>
+        </p:blipFill>
+        <p:spPr>
+          <a:xfrm>
+            <a:off x="2375337" y="1115060"/>
+            <a:ext cx="7612775" cy="5580000"/>
+          </a:xfrm>
+          <a:prstGeom prst="rect">
+            <a:avLst/>
+          </a:prstGeom>
+        </p:spPr>
+      </p:pic>
+    </p:spTree>
+    <p:extLst>
+      <p:ext uri="{BB962C8B-B14F-4D97-AF65-F5344CB8AC3E}">
+        <p14:creationId xmlns:p14="http://schemas.microsoft.com/office/powerpoint/2010/main" val="975138619"/>
+      </p:ext>
+    </p:extLst>
+  </p:cSld>
+  <p:clrMapOvr>
+    <a:masterClrMapping/>
+  </p:clrMapOvr>
+</p:sld>
+</file>
+
+<file path=ppt/slides/slide11.xml><?xml version="1.0" encoding="utf-8"?>
+<p:sld xmlns:a="http://schemas.openxmlformats.org/drawingml/2006/main" xmlns:r="http://schemas.openxmlformats.org/officeDocument/2006/relationships" xmlns:p="http://schemas.openxmlformats.org/presentationml/2006/main">
+  <p:cSld>
+    <p:spTree>
+      <p:nvGrpSpPr>
+        <p:cNvPr id="1" name=""/>
+        <p:cNvGrpSpPr/>
+        <p:nvPr/>
+      </p:nvGrpSpPr>
+      <p:grpSpPr>
+        <a:xfrm>
+          <a:off x="0" y="0"/>
+          <a:ext cx="0" cy="0"/>
+          <a:chOff x="0" y="0"/>
+          <a:chExt cx="0" cy="0"/>
+        </a:xfrm>
+      </p:grpSpPr>
+      <p:sp>
+        <p:nvSpPr>
+          <p:cNvPr id="4" name="Rectangle 3">
+            <a:extLst>
+              <a:ext uri="{FF2B5EF4-FFF2-40B4-BE49-F238E27FC236}">
+                <a16:creationId xmlns:a16="http://schemas.microsoft.com/office/drawing/2014/main" id="{F029BABF-5558-4BCA-6A44-279E29A04241}"/>
+              </a:ext>
+            </a:extLst>
+          </p:cNvPr>
+          <p:cNvSpPr/>
+          <p:nvPr/>
+        </p:nvSpPr>
+        <p:spPr>
+          <a:xfrm>
+            <a:off x="3005137" y="209550"/>
+            <a:ext cx="6181725" cy="914400"/>
+          </a:xfrm>
+          <a:prstGeom prst="rect">
+            <a:avLst/>
+          </a:prstGeom>
+          <a:noFill/>
+        </p:spPr>
+        <p:style>
+          <a:lnRef idx="2">
+            <a:schemeClr val="accent1">
+              <a:shade val="15000"/>
+            </a:schemeClr>
+          </a:lnRef>
+          <a:fillRef idx="1">
+            <a:schemeClr val="accent1"/>
+          </a:fillRef>
+          <a:effectRef idx="0">
+            <a:schemeClr val="accent1"/>
+          </a:effectRef>
+          <a:fontRef idx="minor">
+            <a:schemeClr val="lt1"/>
+          </a:fontRef>
+        </p:style>
+        <p:txBody>
+          <a:bodyPr rtlCol="0" anchor="ctr"/>
+          <a:lstStyle/>
+          <a:p>
+            <a:pPr algn="ctr"/>
+            <a:r>
+              <a:rPr lang="fr-FR" sz="2800" dirty="0">
+                <a:solidFill>
+                  <a:schemeClr val="tx1"/>
+                </a:solidFill>
+                <a:latin typeface="Calibri" panose="020F0502020204030204" pitchFamily="34" charset="0"/>
+                <a:cs typeface="Calibri" panose="020F0502020204030204" pitchFamily="34" charset="0"/>
+              </a:rPr>
+              <a:t>Quel gardien a effectué le plus d’arrêt ?</a:t>
+            </a:r>
+          </a:p>
+        </p:txBody>
+      </p:sp>
+      <p:pic>
+        <p:nvPicPr>
+          <p:cNvPr id="6" name="Image 5">
+            <a:extLst>
+              <a:ext uri="{FF2B5EF4-FFF2-40B4-BE49-F238E27FC236}">
+                <a16:creationId xmlns:a16="http://schemas.microsoft.com/office/drawing/2014/main" id="{E31D9218-1927-B681-A71A-036F90C26492}"/>
+              </a:ext>
+            </a:extLst>
+          </p:cNvPr>
+          <p:cNvPicPr>
+            <a:picLocks noChangeAspect="1"/>
+          </p:cNvPicPr>
+          <p:nvPr/>
+        </p:nvPicPr>
+        <p:blipFill>
+          <a:blip r:embed="rId2"/>
+          <a:stretch>
+            <a:fillRect/>
+          </a:stretch>
+        </p:blipFill>
+        <p:spPr>
+          <a:xfrm>
+            <a:off x="1347444" y="1666560"/>
+            <a:ext cx="4925112" cy="4515480"/>
+          </a:xfrm>
+          <a:prstGeom prst="rect">
+            <a:avLst/>
+          </a:prstGeom>
+        </p:spPr>
+      </p:pic>
+      <p:sp>
+        <p:nvSpPr>
+          <p:cNvPr id="7" name="Rectangle 6">
+            <a:extLst>
+              <a:ext uri="{FF2B5EF4-FFF2-40B4-BE49-F238E27FC236}">
+                <a16:creationId xmlns:a16="http://schemas.microsoft.com/office/drawing/2014/main" id="{AF248FAC-2525-CB8A-1DF5-4AE5B08A7369}"/>
+              </a:ext>
+            </a:extLst>
+          </p:cNvPr>
+          <p:cNvSpPr/>
+          <p:nvPr/>
+        </p:nvSpPr>
+        <p:spPr>
+          <a:xfrm>
+            <a:off x="6843712" y="2671762"/>
+            <a:ext cx="4686299" cy="1514476"/>
+          </a:xfrm>
+          <a:prstGeom prst="rect">
+            <a:avLst/>
+          </a:prstGeom>
+          <a:noFill/>
+        </p:spPr>
+        <p:style>
+          <a:lnRef idx="2">
+            <a:schemeClr val="accent1">
+              <a:shade val="15000"/>
+            </a:schemeClr>
+          </a:lnRef>
+          <a:fillRef idx="1">
+            <a:schemeClr val="accent1"/>
+          </a:fillRef>
+          <a:effectRef idx="0">
+            <a:schemeClr val="accent1"/>
+          </a:effectRef>
+          <a:fontRef idx="minor">
+            <a:schemeClr val="lt1"/>
+          </a:fontRef>
+        </p:style>
+        <p:txBody>
+          <a:bodyPr rtlCol="0" anchor="ctr"/>
+          <a:lstStyle/>
+          <a:p>
+            <a:pPr marL="285750" indent="-285750">
+              <a:buFont typeface="Arial" panose="020B0604020202020204" pitchFamily="34" charset="0"/>
+              <a:buChar char="•"/>
+            </a:pPr>
+            <a:r>
+              <a:rPr lang="fr-FR" dirty="0">
+                <a:solidFill>
+                  <a:schemeClr val="tx1"/>
+                </a:solidFill>
+                <a:latin typeface="Calibri" panose="020F0502020204030204" pitchFamily="34" charset="0"/>
+                <a:cs typeface="Calibri" panose="020F0502020204030204" pitchFamily="34" charset="0"/>
+              </a:rPr>
+              <a:t>Fabien </a:t>
+            </a:r>
+            <a:r>
+              <a:rPr lang="fr-FR" dirty="0" err="1">
+                <a:solidFill>
+                  <a:schemeClr val="tx1"/>
+                </a:solidFill>
+                <a:latin typeface="Calibri" panose="020F0502020204030204" pitchFamily="34" charset="0"/>
+                <a:cs typeface="Calibri" panose="020F0502020204030204" pitchFamily="34" charset="0"/>
+              </a:rPr>
+              <a:t>barthez</a:t>
+            </a:r>
+            <a:r>
+              <a:rPr lang="fr-FR" dirty="0">
+                <a:solidFill>
+                  <a:schemeClr val="tx1"/>
+                </a:solidFill>
+                <a:latin typeface="Calibri" panose="020F0502020204030204" pitchFamily="34" charset="0"/>
+                <a:cs typeface="Calibri" panose="020F0502020204030204" pitchFamily="34" charset="0"/>
+              </a:rPr>
+              <a:t> : 23 arrêts en 7 matchs (~3,28/match)</a:t>
+            </a:r>
+          </a:p>
+          <a:p>
+            <a:pPr marL="285750" indent="-285750">
+              <a:buFont typeface="Arial" panose="020B0604020202020204" pitchFamily="34" charset="0"/>
+              <a:buChar char="•"/>
+            </a:pPr>
+            <a:r>
+              <a:rPr lang="fr-FR" dirty="0">
+                <a:solidFill>
+                  <a:schemeClr val="tx1"/>
+                </a:solidFill>
+                <a:latin typeface="Calibri" panose="020F0502020204030204" pitchFamily="34" charset="0"/>
+                <a:cs typeface="Calibri" panose="020F0502020204030204" pitchFamily="34" charset="0"/>
+              </a:rPr>
+              <a:t>Hugo Lloris : 16 arrêts en 6 matchs (~2,66/match)</a:t>
+            </a:r>
+          </a:p>
+        </p:txBody>
+      </p:sp>
+    </p:spTree>
+    <p:extLst>
+      <p:ext uri="{BB962C8B-B14F-4D97-AF65-F5344CB8AC3E}">
+        <p14:creationId xmlns:p14="http://schemas.microsoft.com/office/powerpoint/2010/main" val="1290989548"/>
+      </p:ext>
+    </p:extLst>
+  </p:cSld>
+  <p:clrMapOvr>
+    <a:masterClrMapping/>
+  </p:clrMapOvr>
+</p:sld>
+</file>
+
+<file path=ppt/slides/slide12.xml><?xml version="1.0" encoding="utf-8"?>
+<p:sld xmlns:a="http://schemas.openxmlformats.org/drawingml/2006/main" xmlns:r="http://schemas.openxmlformats.org/officeDocument/2006/relationships" xmlns:p="http://schemas.openxmlformats.org/presentationml/2006/main">
+  <p:cSld>
+    <p:spTree>
+      <p:nvGrpSpPr>
+        <p:cNvPr id="1" name=""/>
+        <p:cNvGrpSpPr/>
+        <p:nvPr/>
+      </p:nvGrpSpPr>
+      <p:grpSpPr>
+        <a:xfrm>
+          <a:off x="0" y="0"/>
+          <a:ext cx="0" cy="0"/>
+          <a:chOff x="0" y="0"/>
+          <a:chExt cx="0" cy="0"/>
+        </a:xfrm>
+      </p:grpSpPr>
+      <p:sp>
+        <p:nvSpPr>
+          <p:cNvPr id="5" name="ZoneTexte 4">
+            <a:extLst>
+              <a:ext uri="{FF2B5EF4-FFF2-40B4-BE49-F238E27FC236}">
+                <a16:creationId xmlns:a16="http://schemas.microsoft.com/office/drawing/2014/main" id="{5FA2EA80-B3EB-FF89-6055-78A71FD4D4E0}"/>
+              </a:ext>
+            </a:extLst>
+          </p:cNvPr>
+          <p:cNvSpPr txBox="1"/>
+          <p:nvPr/>
+        </p:nvSpPr>
+        <p:spPr>
+          <a:xfrm>
+            <a:off x="261938" y="366623"/>
+            <a:ext cx="11668124" cy="6124754"/>
+          </a:xfrm>
+          <a:prstGeom prst="rect">
+            <a:avLst/>
+          </a:prstGeom>
+          <a:noFill/>
+        </p:spPr>
+        <p:txBody>
+          <a:bodyPr wrap="square">
+            <a:spAutoFit/>
+          </a:bodyPr>
+          <a:lstStyle/>
+          <a:p>
+            <a:pPr algn="l">
+              <a:buFont typeface="+mj-lt"/>
+              <a:buAutoNum type="arabicPeriod"/>
+            </a:pPr>
+            <a:r>
+              <a:rPr lang="fr-FR" sz="1400" b="1" i="0" dirty="0">
+                <a:solidFill>
+                  <a:srgbClr val="0D0D0D"/>
+                </a:solidFill>
+                <a:effectLst/>
+                <a:latin typeface="Calibri" panose="020F0502020204030204" pitchFamily="34" charset="0"/>
+                <a:cs typeface="Calibri" panose="020F0502020204030204" pitchFamily="34" charset="0"/>
+              </a:rPr>
+              <a:t>Analyse des performances individuelles</a:t>
+            </a:r>
+            <a:r>
+              <a:rPr lang="fr-FR" sz="1400" b="0" i="0" dirty="0">
+                <a:solidFill>
+                  <a:srgbClr val="0D0D0D"/>
+                </a:solidFill>
+                <a:effectLst/>
+                <a:latin typeface="Calibri" panose="020F0502020204030204" pitchFamily="34" charset="0"/>
+                <a:cs typeface="Calibri" panose="020F0502020204030204" pitchFamily="34" charset="0"/>
+              </a:rPr>
+              <a:t> :</a:t>
+            </a:r>
+          </a:p>
+          <a:p>
+            <a:pPr marL="742950" lvl="1" indent="-285750" algn="l">
+              <a:buFont typeface="+mj-lt"/>
+              <a:buAutoNum type="arabicPeriod"/>
+            </a:pPr>
+            <a:r>
+              <a:rPr lang="fr-FR" sz="1400" b="0" i="0" dirty="0">
+                <a:solidFill>
+                  <a:srgbClr val="0D0D0D"/>
+                </a:solidFill>
+                <a:effectLst/>
+                <a:latin typeface="Calibri" panose="020F0502020204030204" pitchFamily="34" charset="0"/>
+                <a:cs typeface="Calibri" panose="020F0502020204030204" pitchFamily="34" charset="0"/>
+              </a:rPr>
+              <a:t>Calculez la moyenne, la médiane, l'écart-type, etc. des différentes statistiques (Arrêts, Buts, Passes décisives, Occasions, Cartons jaunes, Cartons rouges, Minutes jouées) pour chaque joueur.</a:t>
+            </a:r>
+          </a:p>
+          <a:p>
+            <a:pPr marL="742950" lvl="1" indent="-285750" algn="l">
+              <a:buFont typeface="+mj-lt"/>
+              <a:buAutoNum type="arabicPeriod"/>
+            </a:pPr>
+            <a:r>
+              <a:rPr lang="fr-FR" sz="1400" b="0" i="0" dirty="0">
+                <a:solidFill>
+                  <a:srgbClr val="0D0D0D"/>
+                </a:solidFill>
+                <a:effectLst/>
+                <a:latin typeface="Calibri" panose="020F0502020204030204" pitchFamily="34" charset="0"/>
+                <a:cs typeface="Calibri" panose="020F0502020204030204" pitchFamily="34" charset="0"/>
+              </a:rPr>
+              <a:t>Identifiez les meilleurs et les moins performants dans chaque catégorie statistique.</a:t>
+            </a:r>
+          </a:p>
+          <a:p>
+            <a:pPr algn="l">
+              <a:buFont typeface="+mj-lt"/>
+              <a:buAutoNum type="arabicPeriod"/>
+            </a:pPr>
+            <a:r>
+              <a:rPr lang="fr-FR" sz="1400" b="1" i="0" dirty="0">
+                <a:solidFill>
+                  <a:srgbClr val="0D0D0D"/>
+                </a:solidFill>
+                <a:effectLst/>
+                <a:latin typeface="Calibri" panose="020F0502020204030204" pitchFamily="34" charset="0"/>
+                <a:cs typeface="Calibri" panose="020F0502020204030204" pitchFamily="34" charset="0"/>
+              </a:rPr>
+              <a:t>Comparaison entre les Coupes du Monde 1998 et 2018</a:t>
+            </a:r>
+            <a:r>
+              <a:rPr lang="fr-FR" sz="1400" b="0" i="0" dirty="0">
+                <a:solidFill>
+                  <a:srgbClr val="0D0D0D"/>
+                </a:solidFill>
+                <a:effectLst/>
+                <a:latin typeface="Calibri" panose="020F0502020204030204" pitchFamily="34" charset="0"/>
+                <a:cs typeface="Calibri" panose="020F0502020204030204" pitchFamily="34" charset="0"/>
+              </a:rPr>
+              <a:t> :</a:t>
+            </a:r>
+          </a:p>
+          <a:p>
+            <a:pPr marL="742950" lvl="1" indent="-285750" algn="l">
+              <a:buFont typeface="+mj-lt"/>
+              <a:buAutoNum type="arabicPeriod"/>
+            </a:pPr>
+            <a:r>
+              <a:rPr lang="fr-FR" sz="1400" b="0" i="0" dirty="0">
+                <a:solidFill>
+                  <a:srgbClr val="0D0D0D"/>
+                </a:solidFill>
+                <a:effectLst/>
+                <a:latin typeface="Calibri" panose="020F0502020204030204" pitchFamily="34" charset="0"/>
+                <a:cs typeface="Calibri" panose="020F0502020204030204" pitchFamily="34" charset="0"/>
+              </a:rPr>
+              <a:t>Comparez les performances globales de l'équipe de France lors des deux Coupes du Monde.</a:t>
+            </a:r>
+          </a:p>
+          <a:p>
+            <a:pPr marL="742950" lvl="1" indent="-285750" algn="l">
+              <a:buFont typeface="+mj-lt"/>
+              <a:buAutoNum type="arabicPeriod"/>
+            </a:pPr>
+            <a:r>
+              <a:rPr lang="fr-FR" sz="1400" b="0" i="0" dirty="0">
+                <a:solidFill>
+                  <a:srgbClr val="0D0D0D"/>
+                </a:solidFill>
+                <a:effectLst/>
+                <a:latin typeface="Calibri" panose="020F0502020204030204" pitchFamily="34" charset="0"/>
+                <a:cs typeface="Calibri" panose="020F0502020204030204" pitchFamily="34" charset="0"/>
+              </a:rPr>
+              <a:t>Analysez les différences dans les statistiques clés telles que le nombre de buts marqués, le nombre d'arrêts effectués, etc.</a:t>
+            </a:r>
+          </a:p>
+          <a:p>
+            <a:pPr marL="742950" lvl="1" indent="-285750" algn="l">
+              <a:buFont typeface="+mj-lt"/>
+              <a:buAutoNum type="arabicPeriod"/>
+            </a:pPr>
+            <a:r>
+              <a:rPr lang="fr-FR" sz="1400" b="0" i="0" dirty="0">
+                <a:solidFill>
+                  <a:srgbClr val="0D0D0D"/>
+                </a:solidFill>
+                <a:effectLst/>
+                <a:latin typeface="Calibri" panose="020F0502020204030204" pitchFamily="34" charset="0"/>
+                <a:cs typeface="Calibri" panose="020F0502020204030204" pitchFamily="34" charset="0"/>
+              </a:rPr>
+              <a:t>Identifiez les tendances ou les changements dans les performances de l'équipe de France entre ces deux éditions.</a:t>
+            </a:r>
+          </a:p>
+          <a:p>
+            <a:pPr algn="l">
+              <a:buFont typeface="+mj-lt"/>
+              <a:buAutoNum type="arabicPeriod"/>
+            </a:pPr>
+            <a:r>
+              <a:rPr lang="fr-FR" sz="1400" b="1" i="0" dirty="0">
+                <a:solidFill>
+                  <a:srgbClr val="0D0D0D"/>
+                </a:solidFill>
+                <a:effectLst/>
+                <a:latin typeface="Calibri" panose="020F0502020204030204" pitchFamily="34" charset="0"/>
+                <a:cs typeface="Calibri" panose="020F0502020204030204" pitchFamily="34" charset="0"/>
+              </a:rPr>
+              <a:t>Analyse de la distribution des performances par poste</a:t>
+            </a:r>
+            <a:r>
+              <a:rPr lang="fr-FR" sz="1400" b="0" i="0" dirty="0">
+                <a:solidFill>
+                  <a:srgbClr val="0D0D0D"/>
+                </a:solidFill>
+                <a:effectLst/>
+                <a:latin typeface="Calibri" panose="020F0502020204030204" pitchFamily="34" charset="0"/>
+                <a:cs typeface="Calibri" panose="020F0502020204030204" pitchFamily="34" charset="0"/>
+              </a:rPr>
+              <a:t> :</a:t>
+            </a:r>
+          </a:p>
+          <a:p>
+            <a:pPr marL="742950" lvl="1" indent="-285750" algn="l">
+              <a:buFont typeface="+mj-lt"/>
+              <a:buAutoNum type="arabicPeriod"/>
+            </a:pPr>
+            <a:r>
+              <a:rPr lang="fr-FR" sz="1400" b="0" i="0" dirty="0">
+                <a:solidFill>
+                  <a:srgbClr val="0D0D0D"/>
+                </a:solidFill>
+                <a:effectLst/>
+                <a:latin typeface="Calibri" panose="020F0502020204030204" pitchFamily="34" charset="0"/>
+                <a:cs typeface="Calibri" panose="020F0502020204030204" pitchFamily="34" charset="0"/>
+              </a:rPr>
+              <a:t>Analysez les performances des joueurs en fonction de leur poste sur le terrain (par exemple, gardien de but, défenseur, milieu de terrain, attaquant).</a:t>
+            </a:r>
+          </a:p>
+          <a:p>
+            <a:pPr marL="742950" lvl="1" indent="-285750" algn="l">
+              <a:buFont typeface="+mj-lt"/>
+              <a:buAutoNum type="arabicPeriod"/>
+            </a:pPr>
+            <a:r>
+              <a:rPr lang="fr-FR" sz="1400" b="0" i="0" dirty="0">
+                <a:solidFill>
+                  <a:srgbClr val="0D0D0D"/>
+                </a:solidFill>
+                <a:effectLst/>
+                <a:latin typeface="Calibri" panose="020F0502020204030204" pitchFamily="34" charset="0"/>
+                <a:cs typeface="Calibri" panose="020F0502020204030204" pitchFamily="34" charset="0"/>
+              </a:rPr>
+              <a:t>Comparez les contributions des différents postes aux statistiques globales de l'équipe.</a:t>
+            </a:r>
+          </a:p>
+          <a:p>
+            <a:pPr algn="l">
+              <a:buFont typeface="+mj-lt"/>
+              <a:buAutoNum type="arabicPeriod"/>
+            </a:pPr>
+            <a:r>
+              <a:rPr lang="fr-FR" sz="1400" b="1" i="0" dirty="0">
+                <a:solidFill>
+                  <a:srgbClr val="0D0D0D"/>
+                </a:solidFill>
+                <a:effectLst/>
+                <a:latin typeface="Calibri" panose="020F0502020204030204" pitchFamily="34" charset="0"/>
+                <a:cs typeface="Calibri" panose="020F0502020204030204" pitchFamily="34" charset="0"/>
+              </a:rPr>
+              <a:t>Corrélations entre les différentes statistiques</a:t>
+            </a:r>
+            <a:r>
+              <a:rPr lang="fr-FR" sz="1400" b="0" i="0" dirty="0">
+                <a:solidFill>
+                  <a:srgbClr val="0D0D0D"/>
+                </a:solidFill>
+                <a:effectLst/>
+                <a:latin typeface="Calibri" panose="020F0502020204030204" pitchFamily="34" charset="0"/>
+                <a:cs typeface="Calibri" panose="020F0502020204030204" pitchFamily="34" charset="0"/>
+              </a:rPr>
+              <a:t> :</a:t>
+            </a:r>
+          </a:p>
+          <a:p>
+            <a:pPr marL="742950" lvl="1" indent="-285750" algn="l">
+              <a:buFont typeface="+mj-lt"/>
+              <a:buAutoNum type="arabicPeriod"/>
+            </a:pPr>
+            <a:r>
+              <a:rPr lang="fr-FR" sz="1400" b="0" i="0" dirty="0">
+                <a:solidFill>
+                  <a:srgbClr val="0D0D0D"/>
+                </a:solidFill>
+                <a:effectLst/>
+                <a:latin typeface="Calibri" panose="020F0502020204030204" pitchFamily="34" charset="0"/>
+                <a:cs typeface="Calibri" panose="020F0502020204030204" pitchFamily="34" charset="0"/>
+              </a:rPr>
+              <a:t>Recherchez des corrélations entre les différentes statistiques (par exemple, le nombre de buts marqués par un joueur et le nombre de passes décisives qu'il a effectuées).</a:t>
+            </a:r>
+          </a:p>
+          <a:p>
+            <a:pPr marL="742950" lvl="1" indent="-285750" algn="l">
+              <a:buFont typeface="+mj-lt"/>
+              <a:buAutoNum type="arabicPeriod"/>
+            </a:pPr>
+            <a:r>
+              <a:rPr lang="fr-FR" sz="1400" b="0" i="0" dirty="0">
+                <a:solidFill>
+                  <a:srgbClr val="0D0D0D"/>
+                </a:solidFill>
+                <a:effectLst/>
+                <a:latin typeface="Calibri" panose="020F0502020204030204" pitchFamily="34" charset="0"/>
+                <a:cs typeface="Calibri" panose="020F0502020204030204" pitchFamily="34" charset="0"/>
+              </a:rPr>
+              <a:t>Identifiez les relations qui pourraient indiquer des tendances ou des préférences tactiques de l'équipe.</a:t>
+            </a:r>
+          </a:p>
+          <a:p>
+            <a:pPr algn="l">
+              <a:buFont typeface="+mj-lt"/>
+              <a:buAutoNum type="arabicPeriod"/>
+            </a:pPr>
+            <a:r>
+              <a:rPr lang="fr-FR" sz="1400" b="1" i="0" dirty="0">
+                <a:solidFill>
+                  <a:srgbClr val="0D0D0D"/>
+                </a:solidFill>
+                <a:effectLst/>
+                <a:latin typeface="Calibri" panose="020F0502020204030204" pitchFamily="34" charset="0"/>
+                <a:cs typeface="Calibri" panose="020F0502020204030204" pitchFamily="34" charset="0"/>
+              </a:rPr>
+              <a:t>Analyse de l'impact des cartons</a:t>
+            </a:r>
+            <a:r>
+              <a:rPr lang="fr-FR" sz="1400" b="0" i="0" dirty="0">
+                <a:solidFill>
+                  <a:srgbClr val="0D0D0D"/>
+                </a:solidFill>
+                <a:effectLst/>
+                <a:latin typeface="Calibri" panose="020F0502020204030204" pitchFamily="34" charset="0"/>
+                <a:cs typeface="Calibri" panose="020F0502020204030204" pitchFamily="34" charset="0"/>
+              </a:rPr>
+              <a:t> :</a:t>
+            </a:r>
+          </a:p>
+          <a:p>
+            <a:pPr marL="742950" lvl="1" indent="-285750" algn="l">
+              <a:buFont typeface="+mj-lt"/>
+              <a:buAutoNum type="arabicPeriod"/>
+            </a:pPr>
+            <a:r>
+              <a:rPr lang="fr-FR" sz="1400" b="0" i="0" dirty="0">
+                <a:solidFill>
+                  <a:srgbClr val="0D0D0D"/>
+                </a:solidFill>
+                <a:effectLst/>
+                <a:latin typeface="Calibri" panose="020F0502020204030204" pitchFamily="34" charset="0"/>
+                <a:cs typeface="Calibri" panose="020F0502020204030204" pitchFamily="34" charset="0"/>
+              </a:rPr>
+              <a:t>Étudiez l'impact des cartons jaunes et rouges sur les performances individuelles et collectives de l'équipe.</a:t>
+            </a:r>
+          </a:p>
+          <a:p>
+            <a:pPr marL="742950" lvl="1" indent="-285750" algn="l">
+              <a:buFont typeface="+mj-lt"/>
+              <a:buAutoNum type="arabicPeriod"/>
+            </a:pPr>
+            <a:r>
+              <a:rPr lang="fr-FR" sz="1400" b="0" i="0" dirty="0">
+                <a:solidFill>
+                  <a:srgbClr val="0D0D0D"/>
+                </a:solidFill>
+                <a:effectLst/>
+                <a:latin typeface="Calibri" panose="020F0502020204030204" pitchFamily="34" charset="0"/>
+                <a:cs typeface="Calibri" panose="020F0502020204030204" pitchFamily="34" charset="0"/>
+              </a:rPr>
+              <a:t>Analysez si les joueurs ayant reçu des cartons sont plus ou moins performants que ceux qui n'en ont pas reçu.</a:t>
+            </a:r>
+          </a:p>
+          <a:p>
+            <a:pPr algn="l">
+              <a:buFont typeface="+mj-lt"/>
+              <a:buAutoNum type="arabicPeriod"/>
+            </a:pPr>
+            <a:r>
+              <a:rPr lang="fr-FR" sz="1400" b="1" i="0" dirty="0">
+                <a:solidFill>
+                  <a:srgbClr val="0D0D0D"/>
+                </a:solidFill>
+                <a:effectLst/>
+                <a:latin typeface="Calibri" panose="020F0502020204030204" pitchFamily="34" charset="0"/>
+                <a:cs typeface="Calibri" panose="020F0502020204030204" pitchFamily="34" charset="0"/>
+              </a:rPr>
+              <a:t>Analyse de l'efficacité</a:t>
+            </a:r>
+            <a:r>
+              <a:rPr lang="fr-FR" sz="1400" b="0" i="0" dirty="0">
+                <a:solidFill>
+                  <a:srgbClr val="0D0D0D"/>
+                </a:solidFill>
+                <a:effectLst/>
+                <a:latin typeface="Calibri" panose="020F0502020204030204" pitchFamily="34" charset="0"/>
+                <a:cs typeface="Calibri" panose="020F0502020204030204" pitchFamily="34" charset="0"/>
+              </a:rPr>
+              <a:t> :</a:t>
+            </a:r>
+          </a:p>
+          <a:p>
+            <a:pPr marL="742950" lvl="1" indent="-285750" algn="l">
+              <a:buFont typeface="+mj-lt"/>
+              <a:buAutoNum type="arabicPeriod"/>
+            </a:pPr>
+            <a:r>
+              <a:rPr lang="fr-FR" sz="1400" b="0" i="0" dirty="0">
+                <a:solidFill>
+                  <a:srgbClr val="0D0D0D"/>
+                </a:solidFill>
+                <a:effectLst/>
+                <a:latin typeface="Calibri" panose="020F0502020204030204" pitchFamily="34" charset="0"/>
+                <a:cs typeface="Calibri" panose="020F0502020204030204" pitchFamily="34" charset="0"/>
+              </a:rPr>
+              <a:t>Calculez des ratios d'efficacité pour évaluer la performance des joueurs (par exemple, buts marqués par occasion, passes décisives par minute jouée, etc.).</a:t>
+            </a:r>
+          </a:p>
+          <a:p>
+            <a:pPr marL="742950" lvl="1" indent="-285750" algn="l">
+              <a:buFont typeface="+mj-lt"/>
+              <a:buAutoNum type="arabicPeriod"/>
+            </a:pPr>
+            <a:r>
+              <a:rPr lang="fr-FR" sz="1400" b="0" i="0" dirty="0">
+                <a:solidFill>
+                  <a:srgbClr val="0D0D0D"/>
+                </a:solidFill>
+                <a:effectLst/>
+                <a:latin typeface="Calibri" panose="020F0502020204030204" pitchFamily="34" charset="0"/>
+                <a:cs typeface="Calibri" panose="020F0502020204030204" pitchFamily="34" charset="0"/>
+              </a:rPr>
+              <a:t>Identifiez les joueurs les plus efficaces dans différentes situations de jeu.</a:t>
+            </a:r>
+          </a:p>
+          <a:p>
+            <a:pPr algn="l">
+              <a:buFont typeface="+mj-lt"/>
+              <a:buAutoNum type="arabicPeriod"/>
+            </a:pPr>
+            <a:r>
+              <a:rPr lang="fr-FR" sz="1400" b="1" i="0" dirty="0">
+                <a:solidFill>
+                  <a:srgbClr val="0D0D0D"/>
+                </a:solidFill>
+                <a:effectLst/>
+                <a:latin typeface="Calibri" panose="020F0502020204030204" pitchFamily="34" charset="0"/>
+                <a:cs typeface="Calibri" panose="020F0502020204030204" pitchFamily="34" charset="0"/>
+              </a:rPr>
+              <a:t>Analyse de la contribution par minute jouée</a:t>
+            </a:r>
+            <a:r>
+              <a:rPr lang="fr-FR" sz="1400" b="0" i="0" dirty="0">
+                <a:solidFill>
+                  <a:srgbClr val="0D0D0D"/>
+                </a:solidFill>
+                <a:effectLst/>
+                <a:latin typeface="Calibri" panose="020F0502020204030204" pitchFamily="34" charset="0"/>
+                <a:cs typeface="Calibri" panose="020F0502020204030204" pitchFamily="34" charset="0"/>
+              </a:rPr>
+              <a:t> :</a:t>
+            </a:r>
+          </a:p>
+          <a:p>
+            <a:pPr marL="742950" lvl="1" indent="-285750" algn="l">
+              <a:buFont typeface="+mj-lt"/>
+              <a:buAutoNum type="arabicPeriod"/>
+            </a:pPr>
+            <a:r>
+              <a:rPr lang="fr-FR" sz="1400" b="0" i="0" dirty="0">
+                <a:solidFill>
+                  <a:srgbClr val="0D0D0D"/>
+                </a:solidFill>
+                <a:effectLst/>
+                <a:latin typeface="Calibri" panose="020F0502020204030204" pitchFamily="34" charset="0"/>
+                <a:cs typeface="Calibri" panose="020F0502020204030204" pitchFamily="34" charset="0"/>
+              </a:rPr>
+              <a:t>Calculez la contribution moyenne de chaque joueur par minute jouée (par exemple, buts marqués par minute, passes décisives par minute, etc.).</a:t>
+            </a:r>
+          </a:p>
+          <a:p>
+            <a:pPr marL="742950" lvl="1" indent="-285750" algn="l">
+              <a:buFont typeface="+mj-lt"/>
+              <a:buAutoNum type="arabicPeriod"/>
+            </a:pPr>
+            <a:r>
+              <a:rPr lang="fr-FR" sz="1400" b="0" i="0" dirty="0">
+                <a:solidFill>
+                  <a:srgbClr val="0D0D0D"/>
+                </a:solidFill>
+                <a:effectLst/>
+                <a:latin typeface="Calibri" panose="020F0502020204030204" pitchFamily="34" charset="0"/>
+                <a:cs typeface="Calibri" panose="020F0502020204030204" pitchFamily="34" charset="0"/>
+              </a:rPr>
+              <a:t>Identifiez les joueurs les plus influents en termes de contribution par unité de temps.</a:t>
+            </a:r>
+          </a:p>
+          <a:p>
+            <a:pPr algn="l">
+              <a:buFont typeface="+mj-lt"/>
+              <a:buAutoNum type="arabicPeriod"/>
+            </a:pPr>
+            <a:r>
+              <a:rPr lang="fr-FR" sz="1400" b="1" i="0" dirty="0">
+                <a:solidFill>
+                  <a:srgbClr val="0D0D0D"/>
+                </a:solidFill>
+                <a:effectLst/>
+                <a:latin typeface="Calibri" panose="020F0502020204030204" pitchFamily="34" charset="0"/>
+                <a:cs typeface="Calibri" panose="020F0502020204030204" pitchFamily="34" charset="0"/>
+              </a:rPr>
+              <a:t>Modélisation prédictive</a:t>
+            </a:r>
+            <a:r>
+              <a:rPr lang="fr-FR" sz="1400" b="0" i="0" dirty="0">
+                <a:solidFill>
+                  <a:srgbClr val="0D0D0D"/>
+                </a:solidFill>
+                <a:effectLst/>
+                <a:latin typeface="Calibri" panose="020F0502020204030204" pitchFamily="34" charset="0"/>
+                <a:cs typeface="Calibri" panose="020F0502020204030204" pitchFamily="34" charset="0"/>
+              </a:rPr>
+              <a:t> :</a:t>
+            </a:r>
+          </a:p>
+          <a:p>
+            <a:pPr marL="742950" lvl="1" indent="-285750" algn="l">
+              <a:buFont typeface="+mj-lt"/>
+              <a:buAutoNum type="arabicPeriod"/>
+            </a:pPr>
+            <a:r>
+              <a:rPr lang="fr-FR" sz="1400" b="0" i="0" dirty="0">
+                <a:solidFill>
+                  <a:srgbClr val="0D0D0D"/>
+                </a:solidFill>
+                <a:effectLst/>
+                <a:latin typeface="Calibri" panose="020F0502020204030204" pitchFamily="34" charset="0"/>
+                <a:cs typeface="Calibri" panose="020F0502020204030204" pitchFamily="34" charset="0"/>
+              </a:rPr>
+              <a:t>Utilisez des techniques de modélisation pour prédire les performances futures des joueurs ou de l'équipe en fonction de leurs statistiques passées.</a:t>
+            </a:r>
+          </a:p>
+          <a:p>
+            <a:pPr marL="742950" lvl="1" indent="-285750" algn="l">
+              <a:buFont typeface="+mj-lt"/>
+              <a:buAutoNum type="arabicPeriod"/>
+            </a:pPr>
+            <a:r>
+              <a:rPr lang="fr-FR" sz="1400" b="0" i="0" dirty="0">
+                <a:solidFill>
+                  <a:srgbClr val="0D0D0D"/>
+                </a:solidFill>
+                <a:effectLst/>
+                <a:latin typeface="Calibri" panose="020F0502020204030204" pitchFamily="34" charset="0"/>
+                <a:cs typeface="Calibri" panose="020F0502020204030204" pitchFamily="34" charset="0"/>
+              </a:rPr>
+              <a:t>Explorez les facteurs qui pourraient influencer les performances futures.</a:t>
+            </a:r>
+          </a:p>
+        </p:txBody>
+      </p:sp>
+    </p:spTree>
+    <p:extLst>
+      <p:ext uri="{BB962C8B-B14F-4D97-AF65-F5344CB8AC3E}">
+        <p14:creationId xmlns:p14="http://schemas.microsoft.com/office/powerpoint/2010/main" val="2143260159"/>
+      </p:ext>
+    </p:extLst>
+  </p:cSld>
+  <p:clrMapOvr>
+    <a:masterClrMapping/>
+  </p:clrMapOvr>
+</p:sld>
+</file>
+
+<file path=ppt/slides/slide13.xml><?xml version="1.0" encoding="utf-8"?>
+<p:sld xmlns:a="http://schemas.openxmlformats.org/drawingml/2006/main" xmlns:r="http://schemas.openxmlformats.org/officeDocument/2006/relationships" xmlns:p="http://schemas.openxmlformats.org/presentationml/2006/main">
+  <p:cSld>
+    <p:spTree>
+      <p:nvGrpSpPr>
+        <p:cNvPr id="1" name=""/>
+        <p:cNvGrpSpPr/>
+        <p:nvPr/>
+      </p:nvGrpSpPr>
+      <p:grpSpPr>
+        <a:xfrm>
+          <a:off x="0" y="0"/>
+          <a:ext cx="0" cy="0"/>
+          <a:chOff x="0" y="0"/>
+          <a:chExt cx="0" cy="0"/>
+        </a:xfrm>
+      </p:grpSpPr>
+      <p:sp>
+        <p:nvSpPr>
+          <p:cNvPr id="4" name="ZoneTexte 3">
+            <a:extLst>
+              <a:ext uri="{FF2B5EF4-FFF2-40B4-BE49-F238E27FC236}">
+                <a16:creationId xmlns:a16="http://schemas.microsoft.com/office/drawing/2014/main" id="{BA83E0F0-F76A-3CC2-B0F0-AFA146E9130D}"/>
+              </a:ext>
+            </a:extLst>
+          </p:cNvPr>
+          <p:cNvSpPr txBox="1"/>
+          <p:nvPr/>
+        </p:nvSpPr>
+        <p:spPr>
+          <a:xfrm>
+            <a:off x="1257299" y="366623"/>
+            <a:ext cx="10353675" cy="6124754"/>
+          </a:xfrm>
+          <a:prstGeom prst="rect">
+            <a:avLst/>
+          </a:prstGeom>
+          <a:noFill/>
+        </p:spPr>
+        <p:txBody>
+          <a:bodyPr wrap="square">
+            <a:spAutoFit/>
+          </a:bodyPr>
+          <a:lstStyle/>
+          <a:p>
+            <a:pPr algn="l">
+              <a:buFont typeface="+mj-lt"/>
+              <a:buAutoNum type="arabicPeriod"/>
+            </a:pPr>
+            <a:r>
+              <a:rPr lang="fr-FR" sz="1400" b="1" i="0" dirty="0">
+                <a:solidFill>
+                  <a:srgbClr val="0D0D0D"/>
+                </a:solidFill>
+                <a:effectLst/>
+                <a:latin typeface="Calibri" panose="020F0502020204030204" pitchFamily="34" charset="0"/>
+                <a:cs typeface="Calibri" panose="020F0502020204030204" pitchFamily="34" charset="0"/>
+              </a:rPr>
+              <a:t>Analyse de la constance des performances</a:t>
+            </a:r>
+            <a:r>
+              <a:rPr lang="fr-FR" sz="1400" b="0" i="0" dirty="0">
+                <a:solidFill>
+                  <a:srgbClr val="0D0D0D"/>
+                </a:solidFill>
+                <a:effectLst/>
+                <a:latin typeface="Calibri" panose="020F0502020204030204" pitchFamily="34" charset="0"/>
+                <a:cs typeface="Calibri" panose="020F0502020204030204" pitchFamily="34" charset="0"/>
+              </a:rPr>
+              <a:t> :</a:t>
+            </a:r>
+          </a:p>
+          <a:p>
+            <a:pPr marL="742950" lvl="1" indent="-285750" algn="l">
+              <a:buFont typeface="+mj-lt"/>
+              <a:buAutoNum type="arabicPeriod"/>
+            </a:pPr>
+            <a:r>
+              <a:rPr lang="fr-FR" sz="1400" b="0" i="0" dirty="0">
+                <a:solidFill>
+                  <a:srgbClr val="0D0D0D"/>
+                </a:solidFill>
+                <a:effectLst/>
+                <a:latin typeface="Calibri" panose="020F0502020204030204" pitchFamily="34" charset="0"/>
+                <a:cs typeface="Calibri" panose="020F0502020204030204" pitchFamily="34" charset="0"/>
+              </a:rPr>
+              <a:t>Étudiez la cohérence des performances des joueurs tout au long du tournoi en examinant les variations dans leurs statistiques d'un match à l'autre.</a:t>
+            </a:r>
+          </a:p>
+          <a:p>
+            <a:pPr marL="742950" lvl="1" indent="-285750" algn="l">
+              <a:buFont typeface="+mj-lt"/>
+              <a:buAutoNum type="arabicPeriod"/>
+            </a:pPr>
+            <a:r>
+              <a:rPr lang="fr-FR" sz="1400" b="0" i="0" dirty="0">
+                <a:solidFill>
+                  <a:srgbClr val="0D0D0D"/>
+                </a:solidFill>
+                <a:effectLst/>
+                <a:latin typeface="Calibri" panose="020F0502020204030204" pitchFamily="34" charset="0"/>
+                <a:cs typeface="Calibri" panose="020F0502020204030204" pitchFamily="34" charset="0"/>
+              </a:rPr>
+              <a:t>Identifiez les joueurs qui maintiennent des performances élevées sur la durée du tournoi.</a:t>
+            </a:r>
+          </a:p>
+          <a:p>
+            <a:pPr algn="l">
+              <a:buFont typeface="+mj-lt"/>
+              <a:buAutoNum type="arabicPeriod"/>
+            </a:pPr>
+            <a:r>
+              <a:rPr lang="fr-FR" sz="1400" b="1" i="0" dirty="0">
+                <a:solidFill>
+                  <a:srgbClr val="0D0D0D"/>
+                </a:solidFill>
+                <a:effectLst/>
+                <a:latin typeface="Calibri" panose="020F0502020204030204" pitchFamily="34" charset="0"/>
+                <a:cs typeface="Calibri" panose="020F0502020204030204" pitchFamily="34" charset="0"/>
+              </a:rPr>
+              <a:t>Analyse de l'efficacité dans les moments clés</a:t>
+            </a:r>
+            <a:r>
+              <a:rPr lang="fr-FR" sz="1400" b="0" i="0" dirty="0">
+                <a:solidFill>
+                  <a:srgbClr val="0D0D0D"/>
+                </a:solidFill>
+                <a:effectLst/>
+                <a:latin typeface="Calibri" panose="020F0502020204030204" pitchFamily="34" charset="0"/>
+                <a:cs typeface="Calibri" panose="020F0502020204030204" pitchFamily="34" charset="0"/>
+              </a:rPr>
+              <a:t> :</a:t>
+            </a:r>
+          </a:p>
+          <a:p>
+            <a:pPr marL="742950" lvl="1" indent="-285750" algn="l">
+              <a:buFont typeface="+mj-lt"/>
+              <a:buAutoNum type="arabicPeriod"/>
+            </a:pPr>
+            <a:r>
+              <a:rPr lang="fr-FR" sz="1400" b="0" i="0" dirty="0">
+                <a:solidFill>
+                  <a:srgbClr val="0D0D0D"/>
+                </a:solidFill>
+                <a:effectLst/>
+                <a:latin typeface="Calibri" panose="020F0502020204030204" pitchFamily="34" charset="0"/>
+                <a:cs typeface="Calibri" panose="020F0502020204030204" pitchFamily="34" charset="0"/>
+              </a:rPr>
+              <a:t>Analysez la performance des joueurs lors des phases à élimination directe ou lors de matchs décisifs.</a:t>
+            </a:r>
+          </a:p>
+          <a:p>
+            <a:pPr marL="742950" lvl="1" indent="-285750" algn="l">
+              <a:buFont typeface="+mj-lt"/>
+              <a:buAutoNum type="arabicPeriod"/>
+            </a:pPr>
+            <a:r>
+              <a:rPr lang="fr-FR" sz="1400" b="0" i="0" dirty="0">
+                <a:solidFill>
+                  <a:srgbClr val="0D0D0D"/>
+                </a:solidFill>
+                <a:effectLst/>
+                <a:latin typeface="Calibri" panose="020F0502020204030204" pitchFamily="34" charset="0"/>
+                <a:cs typeface="Calibri" panose="020F0502020204030204" pitchFamily="34" charset="0"/>
+              </a:rPr>
+              <a:t>Identifiez les joueurs qui montrent une performance accrue dans les moments cruciaux du tournoi.</a:t>
+            </a:r>
+          </a:p>
+          <a:p>
+            <a:pPr algn="l">
+              <a:buFont typeface="+mj-lt"/>
+              <a:buAutoNum type="arabicPeriod"/>
+            </a:pPr>
+            <a:r>
+              <a:rPr lang="fr-FR" sz="1400" b="1" i="0" dirty="0">
+                <a:solidFill>
+                  <a:srgbClr val="0D0D0D"/>
+                </a:solidFill>
+                <a:effectLst/>
+                <a:latin typeface="Calibri" panose="020F0502020204030204" pitchFamily="34" charset="0"/>
+                <a:cs typeface="Calibri" panose="020F0502020204030204" pitchFamily="34" charset="0"/>
+              </a:rPr>
+              <a:t>Analyse de la performance par âge</a:t>
+            </a:r>
+            <a:r>
+              <a:rPr lang="fr-FR" sz="1400" b="0" i="0" dirty="0">
+                <a:solidFill>
+                  <a:srgbClr val="0D0D0D"/>
+                </a:solidFill>
+                <a:effectLst/>
+                <a:latin typeface="Calibri" panose="020F0502020204030204" pitchFamily="34" charset="0"/>
+                <a:cs typeface="Calibri" panose="020F0502020204030204" pitchFamily="34" charset="0"/>
+              </a:rPr>
+              <a:t> :</a:t>
+            </a:r>
+          </a:p>
+          <a:p>
+            <a:pPr marL="742950" lvl="1" indent="-285750" algn="l">
+              <a:buFont typeface="+mj-lt"/>
+              <a:buAutoNum type="arabicPeriod"/>
+            </a:pPr>
+            <a:r>
+              <a:rPr lang="fr-FR" sz="1400" b="0" i="0" dirty="0">
+                <a:solidFill>
+                  <a:srgbClr val="0D0D0D"/>
+                </a:solidFill>
+                <a:effectLst/>
+                <a:latin typeface="Calibri" panose="020F0502020204030204" pitchFamily="34" charset="0"/>
+                <a:cs typeface="Calibri" panose="020F0502020204030204" pitchFamily="34" charset="0"/>
+              </a:rPr>
+              <a:t>Comparez les performances des joueurs en fonction de leur âge lors des Coupes du Monde.</a:t>
+            </a:r>
+          </a:p>
+          <a:p>
+            <a:pPr marL="742950" lvl="1" indent="-285750" algn="l">
+              <a:buFont typeface="+mj-lt"/>
+              <a:buAutoNum type="arabicPeriod"/>
+            </a:pPr>
+            <a:r>
+              <a:rPr lang="fr-FR" sz="1400" b="0" i="0" dirty="0">
+                <a:solidFill>
+                  <a:srgbClr val="0D0D0D"/>
+                </a:solidFill>
+                <a:effectLst/>
+                <a:latin typeface="Calibri" panose="020F0502020204030204" pitchFamily="34" charset="0"/>
+                <a:cs typeface="Calibri" panose="020F0502020204030204" pitchFamily="34" charset="0"/>
+              </a:rPr>
+              <a:t>Identifiez les tendances de performance en fonction de la maturité et de l'expérience des joueurs.</a:t>
+            </a:r>
+          </a:p>
+          <a:p>
+            <a:pPr algn="l">
+              <a:buFont typeface="+mj-lt"/>
+              <a:buAutoNum type="arabicPeriod"/>
+            </a:pPr>
+            <a:r>
+              <a:rPr lang="fr-FR" sz="1400" b="1" i="0" dirty="0">
+                <a:solidFill>
+                  <a:srgbClr val="0D0D0D"/>
+                </a:solidFill>
+                <a:effectLst/>
+                <a:latin typeface="Calibri" panose="020F0502020204030204" pitchFamily="34" charset="0"/>
+                <a:cs typeface="Calibri" panose="020F0502020204030204" pitchFamily="34" charset="0"/>
+              </a:rPr>
+              <a:t>Analyse de l'adaptabilité tactique</a:t>
+            </a:r>
+            <a:r>
+              <a:rPr lang="fr-FR" sz="1400" b="0" i="0" dirty="0">
+                <a:solidFill>
+                  <a:srgbClr val="0D0D0D"/>
+                </a:solidFill>
+                <a:effectLst/>
+                <a:latin typeface="Calibri" panose="020F0502020204030204" pitchFamily="34" charset="0"/>
+                <a:cs typeface="Calibri" panose="020F0502020204030204" pitchFamily="34" charset="0"/>
+              </a:rPr>
+              <a:t> :</a:t>
+            </a:r>
+          </a:p>
+          <a:p>
+            <a:pPr marL="742950" lvl="1" indent="-285750" algn="l">
+              <a:buFont typeface="+mj-lt"/>
+              <a:buAutoNum type="arabicPeriod"/>
+            </a:pPr>
+            <a:r>
+              <a:rPr lang="fr-FR" sz="1400" b="0" i="0" dirty="0">
+                <a:solidFill>
+                  <a:srgbClr val="0D0D0D"/>
+                </a:solidFill>
+                <a:effectLst/>
+                <a:latin typeface="Calibri" panose="020F0502020204030204" pitchFamily="34" charset="0"/>
+                <a:cs typeface="Calibri" panose="020F0502020204030204" pitchFamily="34" charset="0"/>
+              </a:rPr>
+              <a:t>Étudiez la capacité des joueurs à s'adapter à différents systèmes de jeu ou à des rôles changeants sur le terrain.</a:t>
+            </a:r>
+          </a:p>
+          <a:p>
+            <a:pPr marL="742950" lvl="1" indent="-285750" algn="l">
+              <a:buFont typeface="+mj-lt"/>
+              <a:buAutoNum type="arabicPeriod"/>
+            </a:pPr>
+            <a:r>
+              <a:rPr lang="fr-FR" sz="1400" b="0" i="0" dirty="0">
+                <a:solidFill>
+                  <a:srgbClr val="0D0D0D"/>
+                </a:solidFill>
+                <a:effectLst/>
+                <a:latin typeface="Calibri" panose="020F0502020204030204" pitchFamily="34" charset="0"/>
+                <a:cs typeface="Calibri" panose="020F0502020204030204" pitchFamily="34" charset="0"/>
+              </a:rPr>
+              <a:t>Identifiez les joueurs polyvalents qui peuvent contribuer de manière significative dans différents contextes tactiques.</a:t>
+            </a:r>
+          </a:p>
+          <a:p>
+            <a:pPr algn="l">
+              <a:buFont typeface="+mj-lt"/>
+              <a:buAutoNum type="arabicPeriod"/>
+            </a:pPr>
+            <a:r>
+              <a:rPr lang="fr-FR" sz="1400" b="1" i="0" dirty="0">
+                <a:solidFill>
+                  <a:srgbClr val="0D0D0D"/>
+                </a:solidFill>
+                <a:effectLst/>
+                <a:latin typeface="Calibri" panose="020F0502020204030204" pitchFamily="34" charset="0"/>
+                <a:cs typeface="Calibri" panose="020F0502020204030204" pitchFamily="34" charset="0"/>
+              </a:rPr>
+              <a:t>Analyse de la performance en fonction de l'opposition</a:t>
+            </a:r>
+            <a:r>
+              <a:rPr lang="fr-FR" sz="1400" b="0" i="0" dirty="0">
+                <a:solidFill>
+                  <a:srgbClr val="0D0D0D"/>
+                </a:solidFill>
+                <a:effectLst/>
+                <a:latin typeface="Calibri" panose="020F0502020204030204" pitchFamily="34" charset="0"/>
+                <a:cs typeface="Calibri" panose="020F0502020204030204" pitchFamily="34" charset="0"/>
+              </a:rPr>
+              <a:t> :</a:t>
+            </a:r>
+          </a:p>
+          <a:p>
+            <a:pPr marL="742950" lvl="1" indent="-285750" algn="l">
+              <a:buFont typeface="+mj-lt"/>
+              <a:buAutoNum type="arabicPeriod"/>
+            </a:pPr>
+            <a:r>
+              <a:rPr lang="fr-FR" sz="1400" b="0" i="0" dirty="0">
+                <a:solidFill>
+                  <a:srgbClr val="0D0D0D"/>
+                </a:solidFill>
+                <a:effectLst/>
+                <a:latin typeface="Calibri" panose="020F0502020204030204" pitchFamily="34" charset="0"/>
+                <a:cs typeface="Calibri" panose="020F0502020204030204" pitchFamily="34" charset="0"/>
+              </a:rPr>
+              <a:t>Analysez la performance des joueurs contre des équipes de différents niveaux de compétition.</a:t>
+            </a:r>
+          </a:p>
+          <a:p>
+            <a:pPr marL="742950" lvl="1" indent="-285750" algn="l">
+              <a:buFont typeface="+mj-lt"/>
+              <a:buAutoNum type="arabicPeriod"/>
+            </a:pPr>
+            <a:r>
+              <a:rPr lang="fr-FR" sz="1400" b="0" i="0" dirty="0">
+                <a:solidFill>
+                  <a:srgbClr val="0D0D0D"/>
+                </a:solidFill>
+                <a:effectLst/>
+                <a:latin typeface="Calibri" panose="020F0502020204030204" pitchFamily="34" charset="0"/>
+                <a:cs typeface="Calibri" panose="020F0502020204030204" pitchFamily="34" charset="0"/>
+              </a:rPr>
+              <a:t>Identifiez les joueurs qui excellent particulièrement contre des équipes fortes ou faibles.</a:t>
+            </a:r>
+          </a:p>
+          <a:p>
+            <a:pPr algn="l">
+              <a:buFont typeface="+mj-lt"/>
+              <a:buAutoNum type="arabicPeriod"/>
+            </a:pPr>
+            <a:r>
+              <a:rPr lang="fr-FR" sz="1400" b="1" i="0" dirty="0">
+                <a:solidFill>
+                  <a:srgbClr val="0D0D0D"/>
+                </a:solidFill>
+                <a:effectLst/>
+                <a:latin typeface="Calibri" panose="020F0502020204030204" pitchFamily="34" charset="0"/>
+                <a:cs typeface="Calibri" panose="020F0502020204030204" pitchFamily="34" charset="0"/>
+              </a:rPr>
+              <a:t>Analyse de la contribution défensive</a:t>
+            </a:r>
+            <a:r>
+              <a:rPr lang="fr-FR" sz="1400" b="0" i="0" dirty="0">
+                <a:solidFill>
+                  <a:srgbClr val="0D0D0D"/>
+                </a:solidFill>
+                <a:effectLst/>
+                <a:latin typeface="Calibri" panose="020F0502020204030204" pitchFamily="34" charset="0"/>
+                <a:cs typeface="Calibri" panose="020F0502020204030204" pitchFamily="34" charset="0"/>
+              </a:rPr>
+              <a:t> :</a:t>
+            </a:r>
+          </a:p>
+          <a:p>
+            <a:pPr marL="742950" lvl="1" indent="-285750" algn="l">
+              <a:buFont typeface="+mj-lt"/>
+              <a:buAutoNum type="arabicPeriod"/>
+            </a:pPr>
+            <a:r>
+              <a:rPr lang="fr-FR" sz="1400" b="0" i="0" dirty="0">
+                <a:solidFill>
+                  <a:srgbClr val="0D0D0D"/>
+                </a:solidFill>
+                <a:effectLst/>
+                <a:latin typeface="Calibri" panose="020F0502020204030204" pitchFamily="34" charset="0"/>
+                <a:cs typeface="Calibri" panose="020F0502020204030204" pitchFamily="34" charset="0"/>
+              </a:rPr>
+              <a:t>Étudiez la contribution des joueurs à la phase défensive du jeu, en examinant des statistiques telles que les interceptions, les tacles réussis, etc.</a:t>
+            </a:r>
+          </a:p>
+          <a:p>
+            <a:pPr marL="742950" lvl="1" indent="-285750" algn="l">
+              <a:buFont typeface="+mj-lt"/>
+              <a:buAutoNum type="arabicPeriod"/>
+            </a:pPr>
+            <a:r>
+              <a:rPr lang="fr-FR" sz="1400" b="0" i="0" dirty="0">
+                <a:solidFill>
+                  <a:srgbClr val="0D0D0D"/>
+                </a:solidFill>
+                <a:effectLst/>
+                <a:latin typeface="Calibri" panose="020F0502020204030204" pitchFamily="34" charset="0"/>
+                <a:cs typeface="Calibri" panose="020F0502020204030204" pitchFamily="34" charset="0"/>
+              </a:rPr>
+              <a:t>Identifiez les joueurs qui fournissent une contribution défensive solide en plus de leurs performances offensives.</a:t>
+            </a:r>
+          </a:p>
+          <a:p>
+            <a:pPr algn="l">
+              <a:buFont typeface="+mj-lt"/>
+              <a:buAutoNum type="arabicPeriod"/>
+            </a:pPr>
+            <a:r>
+              <a:rPr lang="fr-FR" sz="1400" b="1" i="0" dirty="0">
+                <a:solidFill>
+                  <a:srgbClr val="0D0D0D"/>
+                </a:solidFill>
+                <a:effectLst/>
+                <a:latin typeface="Calibri" panose="020F0502020204030204" pitchFamily="34" charset="0"/>
+                <a:cs typeface="Calibri" panose="020F0502020204030204" pitchFamily="34" charset="0"/>
+              </a:rPr>
+              <a:t>Analyse de la performance en fonction du contexte du match</a:t>
+            </a:r>
+            <a:r>
+              <a:rPr lang="fr-FR" sz="1400" b="0" i="0" dirty="0">
+                <a:solidFill>
+                  <a:srgbClr val="0D0D0D"/>
+                </a:solidFill>
+                <a:effectLst/>
+                <a:latin typeface="Calibri" panose="020F0502020204030204" pitchFamily="34" charset="0"/>
+                <a:cs typeface="Calibri" panose="020F0502020204030204" pitchFamily="34" charset="0"/>
+              </a:rPr>
+              <a:t> :</a:t>
+            </a:r>
+          </a:p>
+          <a:p>
+            <a:pPr marL="742950" lvl="1" indent="-285750" algn="l">
+              <a:buFont typeface="+mj-lt"/>
+              <a:buAutoNum type="arabicPeriod"/>
+            </a:pPr>
+            <a:r>
+              <a:rPr lang="fr-FR" sz="1400" b="0" i="0" dirty="0">
+                <a:solidFill>
+                  <a:srgbClr val="0D0D0D"/>
+                </a:solidFill>
+                <a:effectLst/>
+                <a:latin typeface="Calibri" panose="020F0502020204030204" pitchFamily="34" charset="0"/>
+                <a:cs typeface="Calibri" panose="020F0502020204030204" pitchFamily="34" charset="0"/>
+              </a:rPr>
+              <a:t>Analysez la performance des joueurs en fonction du score du match (par exemple, quand l'équipe est en tête, à égalité ou en retard).</a:t>
+            </a:r>
+          </a:p>
+          <a:p>
+            <a:pPr marL="742950" lvl="1" indent="-285750" algn="l">
+              <a:buFont typeface="+mj-lt"/>
+              <a:buAutoNum type="arabicPeriod"/>
+            </a:pPr>
+            <a:r>
+              <a:rPr lang="fr-FR" sz="1400" b="0" i="0" dirty="0">
+                <a:solidFill>
+                  <a:srgbClr val="0D0D0D"/>
+                </a:solidFill>
+                <a:effectLst/>
+                <a:latin typeface="Calibri" panose="020F0502020204030204" pitchFamily="34" charset="0"/>
+                <a:cs typeface="Calibri" panose="020F0502020204030204" pitchFamily="34" charset="0"/>
+              </a:rPr>
+              <a:t>Identifiez les joueurs qui excellent dans différentes situations de jeu.</a:t>
+            </a:r>
+          </a:p>
+          <a:p>
+            <a:pPr algn="l">
+              <a:buFont typeface="+mj-lt"/>
+              <a:buAutoNum type="arabicPeriod"/>
+            </a:pPr>
+            <a:r>
+              <a:rPr lang="fr-FR" sz="1400" b="1" i="0" dirty="0">
+                <a:solidFill>
+                  <a:srgbClr val="0D0D0D"/>
+                </a:solidFill>
+                <a:effectLst/>
+                <a:latin typeface="Calibri" panose="020F0502020204030204" pitchFamily="34" charset="0"/>
+                <a:cs typeface="Calibri" panose="020F0502020204030204" pitchFamily="34" charset="0"/>
+              </a:rPr>
+              <a:t>Analyse de la performance par style de jeu</a:t>
+            </a:r>
+            <a:r>
+              <a:rPr lang="fr-FR" sz="1400" b="0" i="0" dirty="0">
+                <a:solidFill>
+                  <a:srgbClr val="0D0D0D"/>
+                </a:solidFill>
+                <a:effectLst/>
+                <a:latin typeface="Calibri" panose="020F0502020204030204" pitchFamily="34" charset="0"/>
+                <a:cs typeface="Calibri" panose="020F0502020204030204" pitchFamily="34" charset="0"/>
+              </a:rPr>
+              <a:t> :</a:t>
+            </a:r>
+          </a:p>
+          <a:p>
+            <a:pPr marL="742950" lvl="1" indent="-285750" algn="l">
+              <a:buFont typeface="+mj-lt"/>
+              <a:buAutoNum type="arabicPeriod"/>
+            </a:pPr>
+            <a:r>
+              <a:rPr lang="fr-FR" sz="1400" b="0" i="0" dirty="0">
+                <a:solidFill>
+                  <a:srgbClr val="0D0D0D"/>
+                </a:solidFill>
+                <a:effectLst/>
+                <a:latin typeface="Calibri" panose="020F0502020204030204" pitchFamily="34" charset="0"/>
+                <a:cs typeface="Calibri" panose="020F0502020204030204" pitchFamily="34" charset="0"/>
+              </a:rPr>
+              <a:t>Identifiez les joueurs qui correspondent le mieux à un style de jeu spécifique (par exemple, un jeu de possession, un jeu direct, un jeu de contre-attaque, etc.).</a:t>
+            </a:r>
+          </a:p>
+          <a:p>
+            <a:pPr marL="742950" lvl="1" indent="-285750" algn="l">
+              <a:buFont typeface="+mj-lt"/>
+              <a:buAutoNum type="arabicPeriod"/>
+            </a:pPr>
+            <a:r>
+              <a:rPr lang="fr-FR" sz="1400" b="0" i="0" dirty="0">
+                <a:solidFill>
+                  <a:srgbClr val="0D0D0D"/>
+                </a:solidFill>
+                <a:effectLst/>
+                <a:latin typeface="Calibri" panose="020F0502020204030204" pitchFamily="34" charset="0"/>
+                <a:cs typeface="Calibri" panose="020F0502020204030204" pitchFamily="34" charset="0"/>
+              </a:rPr>
+              <a:t>Analysez comment les joueurs s'adaptent et contribuent à différents styles de jeu.</a:t>
+            </a:r>
+          </a:p>
+        </p:txBody>
+      </p:sp>
+    </p:spTree>
+    <p:extLst>
+      <p:ext uri="{BB962C8B-B14F-4D97-AF65-F5344CB8AC3E}">
+        <p14:creationId xmlns:p14="http://schemas.microsoft.com/office/powerpoint/2010/main" val="2933569816"/>
       </p:ext>
     </p:extLst>
   </p:cSld>
@@ -4793,8 +6257,8 @@
           <a:lstStyle/>
           <a:p>
             <a:pPr marL="1657350" lvl="3" indent="-285750" algn="just">
-              <a:buFont typeface="Arial" panose="020B0604020202020204" pitchFamily="34" charset="0"/>
-              <a:buChar char="•"/>
+              <a:buFont typeface="Wingdings" panose="05000000000000000000" pitchFamily="2" charset="2"/>
+              <a:buChar char="ü"/>
             </a:pPr>
             <a:r>
               <a:rPr lang="fr-FR" dirty="0">
@@ -4836,25 +6300,56 @@
                 <a:latin typeface="Calibri" panose="020F0502020204030204" pitchFamily="34" charset="0"/>
                 <a:cs typeface="Calibri" panose="020F0502020204030204" pitchFamily="34" charset="0"/>
               </a:rPr>
-              <a:t>Nombre d’occasion </a:t>
-            </a:r>
-            <a:r>
-              <a:rPr lang="fr-FR">
+              <a:t>Nombre d’occasion par joueurs</a:t>
+            </a:r>
+          </a:p>
+          <a:p>
+            <a:pPr marL="1657350" lvl="3" indent="-285750" algn="just">
+              <a:buFont typeface="Wingdings" panose="05000000000000000000" pitchFamily="2" charset="2"/>
+              <a:buChar char="ü"/>
+            </a:pPr>
+            <a:r>
+              <a:rPr lang="fr-FR" dirty="0">
                 <a:solidFill>
                   <a:schemeClr val="tx1"/>
                 </a:solidFill>
                 <a:latin typeface="Calibri" panose="020F0502020204030204" pitchFamily="34" charset="0"/>
                 <a:cs typeface="Calibri" panose="020F0502020204030204" pitchFamily="34" charset="0"/>
               </a:rPr>
-              <a:t>par joueurs</a:t>
-            </a:r>
-            <a:endParaRPr lang="fr-FR" dirty="0">
-              <a:solidFill>
-                <a:schemeClr val="tx1"/>
-              </a:solidFill>
-              <a:latin typeface="Calibri" panose="020F0502020204030204" pitchFamily="34" charset="0"/>
-              <a:cs typeface="Calibri" panose="020F0502020204030204" pitchFamily="34" charset="0"/>
-            </a:endParaRPr>
+              <a:t>Nombre de passes décisives</a:t>
+            </a:r>
+          </a:p>
+          <a:p>
+            <a:pPr marL="1657350" lvl="3" indent="-285750" algn="just">
+              <a:buFont typeface="Wingdings" panose="05000000000000000000" pitchFamily="2" charset="2"/>
+              <a:buChar char="ü"/>
+            </a:pPr>
+            <a:r>
+              <a:rPr lang="fr-FR" dirty="0">
+                <a:solidFill>
+                  <a:schemeClr val="tx1"/>
+                </a:solidFill>
+                <a:latin typeface="Calibri" panose="020F0502020204030204" pitchFamily="34" charset="0"/>
+                <a:cs typeface="Calibri" panose="020F0502020204030204" pitchFamily="34" charset="0"/>
+              </a:rPr>
+              <a:t>Meilleur buteur</a:t>
+            </a:r>
+          </a:p>
+          <a:p>
+            <a:pPr marL="1657350" lvl="3" indent="-285750" algn="just">
+              <a:buFont typeface="Wingdings" panose="05000000000000000000" pitchFamily="2" charset="2"/>
+              <a:buChar char="ü"/>
+            </a:pPr>
+            <a:r>
+              <a:rPr lang="fr-FR" dirty="0">
+                <a:solidFill>
+                  <a:schemeClr val="tx1"/>
+                </a:solidFill>
+                <a:latin typeface="Calibri" panose="020F0502020204030204" pitchFamily="34" charset="0"/>
+                <a:cs typeface="Calibri" panose="020F0502020204030204" pitchFamily="34" charset="0"/>
+              </a:rPr>
+              <a:t>Meilleur passeur décisif</a:t>
+            </a:r>
           </a:p>
           <a:p>
             <a:pPr marL="1657350" lvl="3" indent="-285750" algn="just">
@@ -4869,7 +6364,7 @@
                 <a:latin typeface="Calibri" panose="020F0502020204030204" pitchFamily="34" charset="0"/>
                 <a:cs typeface="Calibri" panose="020F0502020204030204" pitchFamily="34" charset="0"/>
               </a:rPr>
-              <a:t>Nombre de passes décisives</a:t>
+              <a:t>Meilleur buteur et passeur décisif</a:t>
             </a:r>
           </a:p>
           <a:p>
@@ -4885,7 +6380,23 @@
                 <a:latin typeface="Calibri" panose="020F0502020204030204" pitchFamily="34" charset="0"/>
                 <a:cs typeface="Calibri" panose="020F0502020204030204" pitchFamily="34" charset="0"/>
               </a:rPr>
-              <a:t>Meilleur buteur</a:t>
+              <a:t>Top 3 ou 5 des Joueurs qui ont eu le plus d’occasion</a:t>
+            </a:r>
+          </a:p>
+          <a:p>
+            <a:pPr marL="1657350" lvl="3" indent="-285750" algn="just">
+              <a:buFont typeface="Wingdings" panose="05000000000000000000" pitchFamily="2" charset="2"/>
+              <a:buChar char="ü"/>
+            </a:pPr>
+            <a:r>
+              <a:rPr lang="fr-FR" dirty="0">
+                <a:solidFill>
+                  <a:schemeClr val="tx1"/>
+                </a:solidFill>
+                <a:latin typeface="Calibri" panose="020F0502020204030204" pitchFamily="34" charset="0"/>
+                <a:cs typeface="Calibri" panose="020F0502020204030204" pitchFamily="34" charset="0"/>
+              </a:rPr>
+              <a:t>Nombre de cartons jaunes</a:t>
             </a:r>
           </a:p>
           <a:p>
@@ -4901,70 +6412,6 @@
                 <a:latin typeface="Calibri" panose="020F0502020204030204" pitchFamily="34" charset="0"/>
                 <a:cs typeface="Calibri" panose="020F0502020204030204" pitchFamily="34" charset="0"/>
               </a:rPr>
-              <a:t>Meilleur passeur décisif</a:t>
-            </a:r>
-          </a:p>
-          <a:p>
-            <a:pPr marL="1657350" lvl="3" indent="-285750" algn="just">
-              <a:buFont typeface="Arial" panose="020B0604020202020204" pitchFamily="34" charset="0"/>
-              <a:buChar char="•"/>
-            </a:pPr>
-            <a:r>
-              <a:rPr lang="fr-FR" dirty="0">
-                <a:solidFill>
-                  <a:schemeClr val="tx1"/>
-                </a:solidFill>
-                <a:latin typeface="Calibri" panose="020F0502020204030204" pitchFamily="34" charset="0"/>
-                <a:cs typeface="Calibri" panose="020F0502020204030204" pitchFamily="34" charset="0"/>
-              </a:rPr>
-              <a:t>Meilleur buteur et passeur décisif</a:t>
-            </a:r>
-          </a:p>
-          <a:p>
-            <a:pPr marL="1657350" lvl="3" indent="-285750" algn="just">
-              <a:buFont typeface="Arial" panose="020B0604020202020204" pitchFamily="34" charset="0"/>
-              <a:buChar char="•"/>
-            </a:pPr>
-            <a:r>
-              <a:rPr lang="fr-FR" dirty="0">
-                <a:solidFill>
-                  <a:schemeClr val="tx1"/>
-                </a:solidFill>
-                <a:latin typeface="Calibri" panose="020F0502020204030204" pitchFamily="34" charset="0"/>
-                <a:cs typeface="Calibri" panose="020F0502020204030204" pitchFamily="34" charset="0"/>
-              </a:rPr>
-              <a:t>Top 3 et 5 des Joueurs qui ont eu le plus d’occasion</a:t>
-            </a:r>
-          </a:p>
-          <a:p>
-            <a:pPr marL="1657350" lvl="3" indent="-285750" algn="just">
-              <a:buFont typeface="Arial" panose="020B0604020202020204" pitchFamily="34" charset="0"/>
-              <a:buChar char="•"/>
-            </a:pPr>
-            <a:r>
-              <a:rPr lang="fr-FR" dirty="0">
-                <a:solidFill>
-                  <a:schemeClr val="tx1"/>
-                </a:solidFill>
-                <a:latin typeface="Calibri" panose="020F0502020204030204" pitchFamily="34" charset="0"/>
-                <a:cs typeface="Calibri" panose="020F0502020204030204" pitchFamily="34" charset="0"/>
-              </a:rPr>
-              <a:t>Nombre de cartons rouges</a:t>
-            </a:r>
-          </a:p>
-          <a:p>
-            <a:pPr marL="1657350" lvl="3" indent="-285750" algn="just">
-              <a:buFont typeface="Arial" panose="020B0604020202020204" pitchFamily="34" charset="0"/>
-              <a:buChar char="•"/>
-            </a:pPr>
-            <a:r>
-              <a:rPr lang="fr-FR" dirty="0">
-                <a:solidFill>
-                  <a:schemeClr val="tx1"/>
-                </a:solidFill>
-                <a:latin typeface="Calibri" panose="020F0502020204030204" pitchFamily="34" charset="0"/>
-                <a:cs typeface="Calibri" panose="020F0502020204030204" pitchFamily="34" charset="0"/>
-              </a:rPr>
               <a:t>Nombre de but à partir des huitièmes de final</a:t>
             </a:r>
           </a:p>
@@ -4974,6 +6421,950 @@
     <p:extLst>
       <p:ext uri="{BB962C8B-B14F-4D97-AF65-F5344CB8AC3E}">
         <p14:creationId xmlns:p14="http://schemas.microsoft.com/office/powerpoint/2010/main" val="1640617127"/>
+      </p:ext>
+    </p:extLst>
+  </p:cSld>
+  <p:clrMapOvr>
+    <a:masterClrMapping/>
+  </p:clrMapOvr>
+</p:sld>
+</file>
+
+<file path=ppt/slides/slide4.xml><?xml version="1.0" encoding="utf-8"?>
+<p:sld xmlns:a="http://schemas.openxmlformats.org/drawingml/2006/main" xmlns:r="http://schemas.openxmlformats.org/officeDocument/2006/relationships" xmlns:p="http://schemas.openxmlformats.org/presentationml/2006/main">
+  <p:cSld>
+    <p:spTree>
+      <p:nvGrpSpPr>
+        <p:cNvPr id="1" name=""/>
+        <p:cNvGrpSpPr/>
+        <p:nvPr/>
+      </p:nvGrpSpPr>
+      <p:grpSpPr>
+        <a:xfrm>
+          <a:off x="0" y="0"/>
+          <a:ext cx="0" cy="0"/>
+          <a:chOff x="0" y="0"/>
+          <a:chExt cx="0" cy="0"/>
+        </a:xfrm>
+      </p:grpSpPr>
+      <p:sp>
+        <p:nvSpPr>
+          <p:cNvPr id="5" name="ZoneTexte 4">
+            <a:extLst>
+              <a:ext uri="{FF2B5EF4-FFF2-40B4-BE49-F238E27FC236}">
+                <a16:creationId xmlns:a16="http://schemas.microsoft.com/office/drawing/2014/main" id="{193437D2-E3D1-CAE0-A54C-96A330804A77}"/>
+              </a:ext>
+            </a:extLst>
+          </p:cNvPr>
+          <p:cNvSpPr txBox="1"/>
+          <p:nvPr/>
+        </p:nvSpPr>
+        <p:spPr>
+          <a:xfrm>
+            <a:off x="847725" y="582067"/>
+            <a:ext cx="10496550" cy="3754874"/>
+          </a:xfrm>
+          <a:prstGeom prst="rect">
+            <a:avLst/>
+          </a:prstGeom>
+          <a:noFill/>
+        </p:spPr>
+        <p:txBody>
+          <a:bodyPr wrap="square">
+            <a:spAutoFit/>
+          </a:bodyPr>
+          <a:lstStyle/>
+          <a:p>
+            <a:pPr algn="l"/>
+            <a:r>
+              <a:rPr lang="fr-FR" sz="1400" b="1" i="0" dirty="0">
+                <a:solidFill>
+                  <a:srgbClr val="0D0D0D"/>
+                </a:solidFill>
+                <a:effectLst/>
+                <a:latin typeface="Calibri" panose="020F0502020204030204" pitchFamily="34" charset="0"/>
+                <a:cs typeface="Calibri" panose="020F0502020204030204" pitchFamily="34" charset="0"/>
+              </a:rPr>
+              <a:t>Nombre de matchs joués</a:t>
+            </a:r>
+            <a:r>
+              <a:rPr lang="fr-FR" sz="1400" b="0" i="0" dirty="0">
+                <a:solidFill>
+                  <a:srgbClr val="0D0D0D"/>
+                </a:solidFill>
+                <a:effectLst/>
+                <a:latin typeface="Calibri" panose="020F0502020204030204" pitchFamily="34" charset="0"/>
+                <a:cs typeface="Calibri" panose="020F0502020204030204" pitchFamily="34" charset="0"/>
+              </a:rPr>
+              <a:t> : Combien de matchs chaque joueur a-t-il disputé lors des deux Coupes du Monde ? </a:t>
+            </a:r>
+          </a:p>
+          <a:p>
+            <a:pPr algn="l"/>
+            <a:endParaRPr lang="fr-FR" sz="1400" b="0" i="0" dirty="0">
+              <a:solidFill>
+                <a:srgbClr val="0D0D0D"/>
+              </a:solidFill>
+              <a:effectLst/>
+              <a:latin typeface="Calibri" panose="020F0502020204030204" pitchFamily="34" charset="0"/>
+              <a:cs typeface="Calibri" panose="020F0502020204030204" pitchFamily="34" charset="0"/>
+            </a:endParaRPr>
+          </a:p>
+          <a:p>
+            <a:pPr algn="l"/>
+            <a:r>
+              <a:rPr lang="fr-FR" sz="1400" b="1" i="0" dirty="0">
+                <a:solidFill>
+                  <a:srgbClr val="0D0D0D"/>
+                </a:solidFill>
+                <a:effectLst/>
+                <a:latin typeface="Calibri" panose="020F0502020204030204" pitchFamily="34" charset="0"/>
+                <a:cs typeface="Calibri" panose="020F0502020204030204" pitchFamily="34" charset="0"/>
+              </a:rPr>
+              <a:t>Tirs au but</a:t>
+            </a:r>
+            <a:r>
+              <a:rPr lang="fr-FR" sz="1400" b="0" i="0" dirty="0">
+                <a:solidFill>
+                  <a:srgbClr val="0D0D0D"/>
+                </a:solidFill>
+                <a:effectLst/>
+                <a:latin typeface="Calibri" panose="020F0502020204030204" pitchFamily="34" charset="0"/>
+                <a:cs typeface="Calibri" panose="020F0502020204030204" pitchFamily="34" charset="0"/>
+              </a:rPr>
+              <a:t> : Le nombre de tirs au but tentés par chaque joueur lors des deux Coupes du Monde pourrait fournir des informations sur leur implication dans les phases d'attaque.</a:t>
+            </a:r>
+          </a:p>
+          <a:p>
+            <a:pPr algn="l"/>
+            <a:endParaRPr lang="fr-FR" sz="1400" b="0" i="0" dirty="0">
+              <a:solidFill>
+                <a:srgbClr val="0D0D0D"/>
+              </a:solidFill>
+              <a:effectLst/>
+              <a:latin typeface="Calibri" panose="020F0502020204030204" pitchFamily="34" charset="0"/>
+              <a:cs typeface="Calibri" panose="020F0502020204030204" pitchFamily="34" charset="0"/>
+            </a:endParaRPr>
+          </a:p>
+          <a:p>
+            <a:pPr algn="l"/>
+            <a:r>
+              <a:rPr lang="fr-FR" sz="1400" b="1" i="0" dirty="0">
+                <a:solidFill>
+                  <a:srgbClr val="0D0D0D"/>
+                </a:solidFill>
+                <a:effectLst/>
+                <a:latin typeface="Calibri" panose="020F0502020204030204" pitchFamily="34" charset="0"/>
+                <a:cs typeface="Calibri" panose="020F0502020204030204" pitchFamily="34" charset="0"/>
+              </a:rPr>
+              <a:t>Cartons reçus</a:t>
+            </a:r>
+            <a:r>
+              <a:rPr lang="fr-FR" sz="1400" b="0" i="0" dirty="0">
+                <a:solidFill>
+                  <a:srgbClr val="0D0D0D"/>
+                </a:solidFill>
+                <a:effectLst/>
+                <a:latin typeface="Calibri" panose="020F0502020204030204" pitchFamily="34" charset="0"/>
+                <a:cs typeface="Calibri" panose="020F0502020204030204" pitchFamily="34" charset="0"/>
+              </a:rPr>
+              <a:t> : Combien de cartons jaunes ou rouges chaque joueur a-t-il reçus lors des deux Coupes du Monde ? Cela pourrait donner un aperçu de leur discipline sur le terrain.</a:t>
+            </a:r>
+          </a:p>
+          <a:p>
+            <a:pPr algn="l"/>
+            <a:endParaRPr lang="fr-FR" sz="1400" b="0" i="0" dirty="0">
+              <a:solidFill>
+                <a:srgbClr val="0D0D0D"/>
+              </a:solidFill>
+              <a:effectLst/>
+              <a:latin typeface="Calibri" panose="020F0502020204030204" pitchFamily="34" charset="0"/>
+              <a:cs typeface="Calibri" panose="020F0502020204030204" pitchFamily="34" charset="0"/>
+            </a:endParaRPr>
+          </a:p>
+          <a:p>
+            <a:pPr algn="l"/>
+            <a:r>
+              <a:rPr lang="fr-FR" sz="1400" b="1" i="0" dirty="0">
+                <a:solidFill>
+                  <a:srgbClr val="0D0D0D"/>
+                </a:solidFill>
+                <a:effectLst/>
+                <a:latin typeface="Calibri" panose="020F0502020204030204" pitchFamily="34" charset="0"/>
+                <a:cs typeface="Calibri" panose="020F0502020204030204" pitchFamily="34" charset="0"/>
+              </a:rPr>
+              <a:t>Minutes jouées</a:t>
+            </a:r>
+            <a:r>
+              <a:rPr lang="fr-FR" sz="1400" b="0" i="0" dirty="0">
+                <a:solidFill>
+                  <a:srgbClr val="0D0D0D"/>
+                </a:solidFill>
+                <a:effectLst/>
+                <a:latin typeface="Calibri" panose="020F0502020204030204" pitchFamily="34" charset="0"/>
+                <a:cs typeface="Calibri" panose="020F0502020204030204" pitchFamily="34" charset="0"/>
+              </a:rPr>
+              <a:t> : Le total des minutes jouées par chaque joueur lors des deux Coupes du Monde pourrait également être intéressant pour évaluer leur temps de jeu et leur importance dans l'équipe.</a:t>
+            </a:r>
+          </a:p>
+          <a:p>
+            <a:pPr algn="l"/>
+            <a:endParaRPr lang="fr-FR" sz="1400" b="1" i="0" dirty="0">
+              <a:solidFill>
+                <a:srgbClr val="0D0D0D"/>
+              </a:solidFill>
+              <a:effectLst/>
+              <a:latin typeface="Calibri" panose="020F0502020204030204" pitchFamily="34" charset="0"/>
+              <a:cs typeface="Calibri" panose="020F0502020204030204" pitchFamily="34" charset="0"/>
+            </a:endParaRPr>
+          </a:p>
+          <a:p>
+            <a:pPr algn="l"/>
+            <a:r>
+              <a:rPr lang="fr-FR" sz="1400" b="1" i="0" dirty="0">
+                <a:solidFill>
+                  <a:srgbClr val="0D0D0D"/>
+                </a:solidFill>
+                <a:effectLst/>
+                <a:latin typeface="Calibri" panose="020F0502020204030204" pitchFamily="34" charset="0"/>
+                <a:cs typeface="Calibri" panose="020F0502020204030204" pitchFamily="34" charset="0"/>
+              </a:rPr>
+              <a:t>Performances individuelles dans les matchs à élimination directe</a:t>
+            </a:r>
+            <a:r>
+              <a:rPr lang="fr-FR" sz="1400" b="0" i="0" dirty="0">
+                <a:solidFill>
+                  <a:srgbClr val="0D0D0D"/>
+                </a:solidFill>
+                <a:effectLst/>
+                <a:latin typeface="Calibri" panose="020F0502020204030204" pitchFamily="34" charset="0"/>
+                <a:cs typeface="Calibri" panose="020F0502020204030204" pitchFamily="34" charset="0"/>
+              </a:rPr>
+              <a:t> : Examiner les performances individuelles des joueurs lors des matchs à élimination directe (huitièmes de finale, quarts de finale, etc.) pourrait être pertinent pour évaluer leur capacité à performer sous pression.</a:t>
+            </a:r>
+          </a:p>
+          <a:p>
+            <a:pPr algn="l"/>
+            <a:endParaRPr lang="fr-FR" sz="1400" b="1" i="0" dirty="0">
+              <a:solidFill>
+                <a:srgbClr val="0D0D0D"/>
+              </a:solidFill>
+              <a:effectLst/>
+              <a:latin typeface="Calibri" panose="020F0502020204030204" pitchFamily="34" charset="0"/>
+              <a:cs typeface="Calibri" panose="020F0502020204030204" pitchFamily="34" charset="0"/>
+            </a:endParaRPr>
+          </a:p>
+          <a:p>
+            <a:pPr algn="l"/>
+            <a:r>
+              <a:rPr lang="fr-FR" sz="1400" b="1" i="0" dirty="0">
+                <a:solidFill>
+                  <a:srgbClr val="0D0D0D"/>
+                </a:solidFill>
+                <a:effectLst/>
+                <a:latin typeface="Calibri" panose="020F0502020204030204" pitchFamily="34" charset="0"/>
+                <a:cs typeface="Calibri" panose="020F0502020204030204" pitchFamily="34" charset="0"/>
+              </a:rPr>
+              <a:t>Évaluation des performances globales de l'équipe</a:t>
+            </a:r>
+            <a:r>
+              <a:rPr lang="fr-FR" sz="1400" b="0" i="0" dirty="0">
+                <a:solidFill>
+                  <a:srgbClr val="0D0D0D"/>
+                </a:solidFill>
+                <a:effectLst/>
+                <a:latin typeface="Calibri" panose="020F0502020204030204" pitchFamily="34" charset="0"/>
+                <a:cs typeface="Calibri" panose="020F0502020204030204" pitchFamily="34" charset="0"/>
+              </a:rPr>
+              <a:t> : En plus des performances individuelles, il serait également intéressant d'examiner les performances globales de l'équipe de France lors des deux Coupes du Monde, telles que le nombre de buts marqués et encaissés, le parcours dans le tournoi, etc.</a:t>
+            </a:r>
+          </a:p>
+        </p:txBody>
+      </p:sp>
+    </p:spTree>
+    <p:extLst>
+      <p:ext uri="{BB962C8B-B14F-4D97-AF65-F5344CB8AC3E}">
+        <p14:creationId xmlns:p14="http://schemas.microsoft.com/office/powerpoint/2010/main" val="3378897331"/>
+      </p:ext>
+    </p:extLst>
+  </p:cSld>
+  <p:clrMapOvr>
+    <a:masterClrMapping/>
+  </p:clrMapOvr>
+</p:sld>
+</file>
+
+<file path=ppt/slides/slide5.xml><?xml version="1.0" encoding="utf-8"?>
+<p:sld xmlns:a="http://schemas.openxmlformats.org/drawingml/2006/main" xmlns:r="http://schemas.openxmlformats.org/officeDocument/2006/relationships" xmlns:p="http://schemas.openxmlformats.org/presentationml/2006/main">
+  <p:cSld>
+    <p:spTree>
+      <p:nvGrpSpPr>
+        <p:cNvPr id="1" name=""/>
+        <p:cNvGrpSpPr/>
+        <p:nvPr/>
+      </p:nvGrpSpPr>
+      <p:grpSpPr>
+        <a:xfrm>
+          <a:off x="0" y="0"/>
+          <a:ext cx="0" cy="0"/>
+          <a:chOff x="0" y="0"/>
+          <a:chExt cx="0" cy="0"/>
+        </a:xfrm>
+      </p:grpSpPr>
+      <p:sp>
+        <p:nvSpPr>
+          <p:cNvPr id="4" name="Rectangle 3">
+            <a:extLst>
+              <a:ext uri="{FF2B5EF4-FFF2-40B4-BE49-F238E27FC236}">
+                <a16:creationId xmlns:a16="http://schemas.microsoft.com/office/drawing/2014/main" id="{B77C5498-3618-174F-EE26-FC8F3E11FE86}"/>
+              </a:ext>
+            </a:extLst>
+          </p:cNvPr>
+          <p:cNvSpPr/>
+          <p:nvPr/>
+        </p:nvSpPr>
+        <p:spPr>
+          <a:xfrm>
+            <a:off x="3494116" y="91440"/>
+            <a:ext cx="5203767" cy="914400"/>
+          </a:xfrm>
+          <a:prstGeom prst="rect">
+            <a:avLst/>
+          </a:prstGeom>
+          <a:noFill/>
+          <a:ln>
+            <a:noFill/>
+          </a:ln>
+        </p:spPr>
+        <p:style>
+          <a:lnRef idx="2">
+            <a:schemeClr val="accent1">
+              <a:shade val="15000"/>
+            </a:schemeClr>
+          </a:lnRef>
+          <a:fillRef idx="1">
+            <a:schemeClr val="accent1"/>
+          </a:fillRef>
+          <a:effectRef idx="0">
+            <a:schemeClr val="accent1"/>
+          </a:effectRef>
+          <a:fontRef idx="minor">
+            <a:schemeClr val="lt1"/>
+          </a:fontRef>
+        </p:style>
+        <p:txBody>
+          <a:bodyPr rtlCol="0" anchor="ctr"/>
+          <a:lstStyle/>
+          <a:p>
+            <a:pPr marL="571500" indent="-571500" algn="ctr">
+              <a:buFont typeface="+mj-lt"/>
+              <a:buAutoNum type="romanUcPeriod" startAt="3"/>
+            </a:pPr>
+            <a:r>
+              <a:rPr lang="fr-FR" sz="2800" dirty="0">
+                <a:solidFill>
+                  <a:schemeClr val="tx1"/>
+                </a:solidFill>
+                <a:latin typeface="Calibri" panose="020F0502020204030204" pitchFamily="34" charset="0"/>
+                <a:cs typeface="Calibri" panose="020F0502020204030204" pitchFamily="34" charset="0"/>
+              </a:rPr>
+              <a:t>Le notebook</a:t>
+            </a:r>
+          </a:p>
+        </p:txBody>
+      </p:sp>
+      <p:sp>
+        <p:nvSpPr>
+          <p:cNvPr id="5" name="Rectangle 4">
+            <a:extLst>
+              <a:ext uri="{FF2B5EF4-FFF2-40B4-BE49-F238E27FC236}">
+                <a16:creationId xmlns:a16="http://schemas.microsoft.com/office/drawing/2014/main" id="{62181CBB-110F-96D0-CAAF-D3B93EFD0877}"/>
+              </a:ext>
+            </a:extLst>
+          </p:cNvPr>
+          <p:cNvSpPr/>
+          <p:nvPr/>
+        </p:nvSpPr>
+        <p:spPr>
+          <a:xfrm>
+            <a:off x="4249339" y="1357310"/>
+            <a:ext cx="7255669" cy="3424239"/>
+          </a:xfrm>
+          <a:prstGeom prst="rect">
+            <a:avLst/>
+          </a:prstGeom>
+          <a:noFill/>
+          <a:ln>
+            <a:solidFill>
+              <a:schemeClr val="tx1"/>
+            </a:solidFill>
+          </a:ln>
+        </p:spPr>
+        <p:style>
+          <a:lnRef idx="2">
+            <a:schemeClr val="accent1">
+              <a:shade val="15000"/>
+            </a:schemeClr>
+          </a:lnRef>
+          <a:fillRef idx="1">
+            <a:schemeClr val="accent1"/>
+          </a:fillRef>
+          <a:effectRef idx="0">
+            <a:schemeClr val="accent1"/>
+          </a:effectRef>
+          <a:fontRef idx="minor">
+            <a:schemeClr val="lt1"/>
+          </a:fontRef>
+        </p:style>
+        <p:txBody>
+          <a:bodyPr rtlCol="0" anchor="ctr"/>
+          <a:lstStyle/>
+          <a:p>
+            <a:pPr marL="285750" indent="-285750" algn="just">
+              <a:buFont typeface="Arial" panose="020B0604020202020204" pitchFamily="34" charset="0"/>
+              <a:buChar char="•"/>
+            </a:pPr>
+            <a:r>
+              <a:rPr lang="fr-FR" dirty="0">
+                <a:solidFill>
+                  <a:schemeClr val="tx1"/>
+                </a:solidFill>
+                <a:latin typeface="Calibri" panose="020F0502020204030204" pitchFamily="34" charset="0"/>
+                <a:cs typeface="Calibri" panose="020F0502020204030204" pitchFamily="34" charset="0"/>
+              </a:rPr>
+              <a:t>Mettre les deux dataframe sur le même notebook et effectuer les calculs de statistiques</a:t>
+            </a:r>
+          </a:p>
+        </p:txBody>
+      </p:sp>
+      <p:pic>
+        <p:nvPicPr>
+          <p:cNvPr id="6" name="Image 5">
+            <a:extLst>
+              <a:ext uri="{FF2B5EF4-FFF2-40B4-BE49-F238E27FC236}">
+                <a16:creationId xmlns:a16="http://schemas.microsoft.com/office/drawing/2014/main" id="{0A0EE418-5395-AD0B-E9C8-FBC2A1E0C45C}"/>
+              </a:ext>
+            </a:extLst>
+          </p:cNvPr>
+          <p:cNvPicPr>
+            <a:picLocks noChangeAspect="1"/>
+          </p:cNvPicPr>
+          <p:nvPr/>
+        </p:nvPicPr>
+        <p:blipFill>
+          <a:blip r:embed="rId2"/>
+          <a:stretch>
+            <a:fillRect/>
+          </a:stretch>
+        </p:blipFill>
+        <p:spPr>
+          <a:xfrm>
+            <a:off x="1900062" y="1604635"/>
+            <a:ext cx="2496633" cy="4680000"/>
+          </a:xfrm>
+          <a:prstGeom prst="rect">
+            <a:avLst/>
+          </a:prstGeom>
+        </p:spPr>
+      </p:pic>
+    </p:spTree>
+    <p:extLst>
+      <p:ext uri="{BB962C8B-B14F-4D97-AF65-F5344CB8AC3E}">
+        <p14:creationId xmlns:p14="http://schemas.microsoft.com/office/powerpoint/2010/main" val="802014151"/>
+      </p:ext>
+    </p:extLst>
+  </p:cSld>
+  <p:clrMapOvr>
+    <a:masterClrMapping/>
+  </p:clrMapOvr>
+</p:sld>
+</file>
+
+<file path=ppt/slides/slide6.xml><?xml version="1.0" encoding="utf-8"?>
+<p:sld xmlns:a="http://schemas.openxmlformats.org/drawingml/2006/main" xmlns:r="http://schemas.openxmlformats.org/officeDocument/2006/relationships" xmlns:p="http://schemas.openxmlformats.org/presentationml/2006/main">
+  <p:cSld>
+    <p:spTree>
+      <p:nvGrpSpPr>
+        <p:cNvPr id="1" name=""/>
+        <p:cNvGrpSpPr/>
+        <p:nvPr/>
+      </p:nvGrpSpPr>
+      <p:grpSpPr>
+        <a:xfrm>
+          <a:off x="0" y="0"/>
+          <a:ext cx="0" cy="0"/>
+          <a:chOff x="0" y="0"/>
+          <a:chExt cx="0" cy="0"/>
+        </a:xfrm>
+      </p:grpSpPr>
+      <p:sp>
+        <p:nvSpPr>
+          <p:cNvPr id="8" name="Rectangle 7">
+            <a:extLst>
+              <a:ext uri="{FF2B5EF4-FFF2-40B4-BE49-F238E27FC236}">
+                <a16:creationId xmlns:a16="http://schemas.microsoft.com/office/drawing/2014/main" id="{8F098549-3474-6C67-1E90-F096C3C83580}"/>
+              </a:ext>
+            </a:extLst>
+          </p:cNvPr>
+          <p:cNvSpPr/>
+          <p:nvPr/>
+        </p:nvSpPr>
+        <p:spPr>
+          <a:xfrm>
+            <a:off x="3267075" y="190500"/>
+            <a:ext cx="5829300" cy="914400"/>
+          </a:xfrm>
+          <a:prstGeom prst="rect">
+            <a:avLst/>
+          </a:prstGeom>
+          <a:noFill/>
+        </p:spPr>
+        <p:style>
+          <a:lnRef idx="2">
+            <a:schemeClr val="accent1">
+              <a:shade val="15000"/>
+            </a:schemeClr>
+          </a:lnRef>
+          <a:fillRef idx="1">
+            <a:schemeClr val="accent1"/>
+          </a:fillRef>
+          <a:effectRef idx="0">
+            <a:schemeClr val="accent1"/>
+          </a:effectRef>
+          <a:fontRef idx="minor">
+            <a:schemeClr val="lt1"/>
+          </a:fontRef>
+        </p:style>
+        <p:txBody>
+          <a:bodyPr rtlCol="0" anchor="ctr"/>
+          <a:lstStyle/>
+          <a:p>
+            <a:pPr algn="ctr"/>
+            <a:r>
+              <a:rPr lang="fr-FR" sz="2800" dirty="0">
+                <a:solidFill>
+                  <a:schemeClr val="tx1"/>
+                </a:solidFill>
+                <a:latin typeface="Calibri" panose="020F0502020204030204" pitchFamily="34" charset="0"/>
+                <a:cs typeface="Calibri" panose="020F0502020204030204" pitchFamily="34" charset="0"/>
+              </a:rPr>
+              <a:t>Nombre de but et de passes décisives en 1998 et 2018</a:t>
+            </a:r>
+          </a:p>
+        </p:txBody>
+      </p:sp>
+      <p:pic>
+        <p:nvPicPr>
+          <p:cNvPr id="14" name="Image 13">
+            <a:extLst>
+              <a:ext uri="{FF2B5EF4-FFF2-40B4-BE49-F238E27FC236}">
+                <a16:creationId xmlns:a16="http://schemas.microsoft.com/office/drawing/2014/main" id="{B4B683EC-4333-7638-0588-DAA445C847AC}"/>
+              </a:ext>
+            </a:extLst>
+          </p:cNvPr>
+          <p:cNvPicPr>
+            <a:picLocks noChangeAspect="1"/>
+          </p:cNvPicPr>
+          <p:nvPr/>
+        </p:nvPicPr>
+        <p:blipFill>
+          <a:blip r:embed="rId2"/>
+          <a:stretch>
+            <a:fillRect/>
+          </a:stretch>
+        </p:blipFill>
+        <p:spPr>
+          <a:xfrm>
+            <a:off x="1309967" y="2056056"/>
+            <a:ext cx="4281567" cy="4320000"/>
+          </a:xfrm>
+          <a:prstGeom prst="rect">
+            <a:avLst/>
+          </a:prstGeom>
+        </p:spPr>
+      </p:pic>
+      <p:pic>
+        <p:nvPicPr>
+          <p:cNvPr id="3" name="Image 2">
+            <a:extLst>
+              <a:ext uri="{FF2B5EF4-FFF2-40B4-BE49-F238E27FC236}">
+                <a16:creationId xmlns:a16="http://schemas.microsoft.com/office/drawing/2014/main" id="{979635E5-3F19-1737-0300-16A7D4B5B63C}"/>
+              </a:ext>
+            </a:extLst>
+          </p:cNvPr>
+          <p:cNvPicPr>
+            <a:picLocks noChangeAspect="1"/>
+          </p:cNvPicPr>
+          <p:nvPr/>
+        </p:nvPicPr>
+        <p:blipFill>
+          <a:blip r:embed="rId3"/>
+          <a:stretch>
+            <a:fillRect/>
+          </a:stretch>
+        </p:blipFill>
+        <p:spPr>
+          <a:xfrm>
+            <a:off x="6840531" y="2165148"/>
+            <a:ext cx="4511687" cy="4210908"/>
+          </a:xfrm>
+          <a:prstGeom prst="rect">
+            <a:avLst/>
+          </a:prstGeom>
+        </p:spPr>
+      </p:pic>
+    </p:spTree>
+    <p:extLst>
+      <p:ext uri="{BB962C8B-B14F-4D97-AF65-F5344CB8AC3E}">
+        <p14:creationId xmlns:p14="http://schemas.microsoft.com/office/powerpoint/2010/main" val="2660076635"/>
+      </p:ext>
+    </p:extLst>
+  </p:cSld>
+  <p:clrMapOvr>
+    <a:masterClrMapping/>
+  </p:clrMapOvr>
+</p:sld>
+</file>
+
+<file path=ppt/slides/slide7.xml><?xml version="1.0" encoding="utf-8"?>
+<p:sld xmlns:a="http://schemas.openxmlformats.org/drawingml/2006/main" xmlns:r="http://schemas.openxmlformats.org/officeDocument/2006/relationships" xmlns:p="http://schemas.openxmlformats.org/presentationml/2006/main">
+  <p:cSld>
+    <p:spTree>
+      <p:nvGrpSpPr>
+        <p:cNvPr id="1" name=""/>
+        <p:cNvGrpSpPr/>
+        <p:nvPr/>
+      </p:nvGrpSpPr>
+      <p:grpSpPr>
+        <a:xfrm>
+          <a:off x="0" y="0"/>
+          <a:ext cx="0" cy="0"/>
+          <a:chOff x="0" y="0"/>
+          <a:chExt cx="0" cy="0"/>
+        </a:xfrm>
+      </p:grpSpPr>
+      <p:sp>
+        <p:nvSpPr>
+          <p:cNvPr id="8" name="Rectangle 7">
+            <a:extLst>
+              <a:ext uri="{FF2B5EF4-FFF2-40B4-BE49-F238E27FC236}">
+                <a16:creationId xmlns:a16="http://schemas.microsoft.com/office/drawing/2014/main" id="{AD1E3097-F2C1-8537-F10C-A04FA9E026D6}"/>
+              </a:ext>
+            </a:extLst>
+          </p:cNvPr>
+          <p:cNvSpPr/>
+          <p:nvPr/>
+        </p:nvSpPr>
+        <p:spPr>
+          <a:xfrm>
+            <a:off x="3267075" y="190500"/>
+            <a:ext cx="5829300" cy="914400"/>
+          </a:xfrm>
+          <a:prstGeom prst="rect">
+            <a:avLst/>
+          </a:prstGeom>
+          <a:noFill/>
+        </p:spPr>
+        <p:style>
+          <a:lnRef idx="2">
+            <a:schemeClr val="accent1">
+              <a:shade val="15000"/>
+            </a:schemeClr>
+          </a:lnRef>
+          <a:fillRef idx="1">
+            <a:schemeClr val="accent1"/>
+          </a:fillRef>
+          <a:effectRef idx="0">
+            <a:schemeClr val="accent1"/>
+          </a:effectRef>
+          <a:fontRef idx="minor">
+            <a:schemeClr val="lt1"/>
+          </a:fontRef>
+        </p:style>
+        <p:txBody>
+          <a:bodyPr rtlCol="0" anchor="ctr"/>
+          <a:lstStyle/>
+          <a:p>
+            <a:pPr algn="ctr"/>
+            <a:r>
+              <a:rPr lang="fr-FR" sz="2800" dirty="0">
+                <a:solidFill>
+                  <a:schemeClr val="tx1"/>
+                </a:solidFill>
+                <a:latin typeface="Calibri" panose="020F0502020204030204" pitchFamily="34" charset="0"/>
+                <a:cs typeface="Calibri" panose="020F0502020204030204" pitchFamily="34" charset="0"/>
+              </a:rPr>
+              <a:t>Meilleurs buteurs de 1998</a:t>
+            </a:r>
+          </a:p>
+        </p:txBody>
+      </p:sp>
+      <p:pic>
+        <p:nvPicPr>
+          <p:cNvPr id="10" name="Image 9">
+            <a:extLst>
+              <a:ext uri="{FF2B5EF4-FFF2-40B4-BE49-F238E27FC236}">
+                <a16:creationId xmlns:a16="http://schemas.microsoft.com/office/drawing/2014/main" id="{1969EFCF-A4C4-E03C-DBD2-02661596415E}"/>
+              </a:ext>
+            </a:extLst>
+          </p:cNvPr>
+          <p:cNvPicPr>
+            <a:picLocks noChangeAspect="1"/>
+          </p:cNvPicPr>
+          <p:nvPr/>
+        </p:nvPicPr>
+        <p:blipFill>
+          <a:blip r:embed="rId2"/>
+          <a:stretch>
+            <a:fillRect/>
+          </a:stretch>
+        </p:blipFill>
+        <p:spPr>
+          <a:xfrm>
+            <a:off x="2259465" y="1334145"/>
+            <a:ext cx="7673069" cy="5247630"/>
+          </a:xfrm>
+          <a:prstGeom prst="rect">
+            <a:avLst/>
+          </a:prstGeom>
+        </p:spPr>
+      </p:pic>
+    </p:spTree>
+    <p:extLst>
+      <p:ext uri="{BB962C8B-B14F-4D97-AF65-F5344CB8AC3E}">
+        <p14:creationId xmlns:p14="http://schemas.microsoft.com/office/powerpoint/2010/main" val="1157391973"/>
+      </p:ext>
+    </p:extLst>
+  </p:cSld>
+  <p:clrMapOvr>
+    <a:masterClrMapping/>
+  </p:clrMapOvr>
+</p:sld>
+</file>
+
+<file path=ppt/slides/slide8.xml><?xml version="1.0" encoding="utf-8"?>
+<p:sld xmlns:a="http://schemas.openxmlformats.org/drawingml/2006/main" xmlns:r="http://schemas.openxmlformats.org/officeDocument/2006/relationships" xmlns:p="http://schemas.openxmlformats.org/presentationml/2006/main">
+  <p:cSld>
+    <p:spTree>
+      <p:nvGrpSpPr>
+        <p:cNvPr id="1" name=""/>
+        <p:cNvGrpSpPr/>
+        <p:nvPr/>
+      </p:nvGrpSpPr>
+      <p:grpSpPr>
+        <a:xfrm>
+          <a:off x="0" y="0"/>
+          <a:ext cx="0" cy="0"/>
+          <a:chOff x="0" y="0"/>
+          <a:chExt cx="0" cy="0"/>
+        </a:xfrm>
+      </p:grpSpPr>
+      <p:sp>
+        <p:nvSpPr>
+          <p:cNvPr id="9" name="Rectangle 8">
+            <a:extLst>
+              <a:ext uri="{FF2B5EF4-FFF2-40B4-BE49-F238E27FC236}">
+                <a16:creationId xmlns:a16="http://schemas.microsoft.com/office/drawing/2014/main" id="{82E41F41-E3B1-55F1-A87F-E421BAB245BD}"/>
+              </a:ext>
+            </a:extLst>
+          </p:cNvPr>
+          <p:cNvSpPr/>
+          <p:nvPr/>
+        </p:nvSpPr>
+        <p:spPr>
+          <a:xfrm>
+            <a:off x="3267075" y="190500"/>
+            <a:ext cx="5829300" cy="914400"/>
+          </a:xfrm>
+          <a:prstGeom prst="rect">
+            <a:avLst/>
+          </a:prstGeom>
+          <a:noFill/>
+        </p:spPr>
+        <p:style>
+          <a:lnRef idx="2">
+            <a:schemeClr val="accent1">
+              <a:shade val="15000"/>
+            </a:schemeClr>
+          </a:lnRef>
+          <a:fillRef idx="1">
+            <a:schemeClr val="accent1"/>
+          </a:fillRef>
+          <a:effectRef idx="0">
+            <a:schemeClr val="accent1"/>
+          </a:effectRef>
+          <a:fontRef idx="minor">
+            <a:schemeClr val="lt1"/>
+          </a:fontRef>
+        </p:style>
+        <p:txBody>
+          <a:bodyPr rtlCol="0" anchor="ctr"/>
+          <a:lstStyle/>
+          <a:p>
+            <a:pPr algn="ctr"/>
+            <a:r>
+              <a:rPr lang="fr-FR" sz="2800" dirty="0">
+                <a:solidFill>
+                  <a:schemeClr val="tx1"/>
+                </a:solidFill>
+                <a:latin typeface="Calibri" panose="020F0502020204030204" pitchFamily="34" charset="0"/>
+                <a:cs typeface="Calibri" panose="020F0502020204030204" pitchFamily="34" charset="0"/>
+              </a:rPr>
+              <a:t>Meilleurs buteurs de 2018</a:t>
+            </a:r>
+          </a:p>
+        </p:txBody>
+      </p:sp>
+      <p:pic>
+        <p:nvPicPr>
+          <p:cNvPr id="11" name="Image 10">
+            <a:extLst>
+              <a:ext uri="{FF2B5EF4-FFF2-40B4-BE49-F238E27FC236}">
+                <a16:creationId xmlns:a16="http://schemas.microsoft.com/office/drawing/2014/main" id="{ABDA6FFF-DF5A-5D5E-8265-15ABA996C17E}"/>
+              </a:ext>
+            </a:extLst>
+          </p:cNvPr>
+          <p:cNvPicPr>
+            <a:picLocks noChangeAspect="1"/>
+          </p:cNvPicPr>
+          <p:nvPr/>
+        </p:nvPicPr>
+        <p:blipFill>
+          <a:blip r:embed="rId2"/>
+          <a:stretch>
+            <a:fillRect/>
+          </a:stretch>
+        </p:blipFill>
+        <p:spPr>
+          <a:xfrm>
+            <a:off x="2085317" y="1328277"/>
+            <a:ext cx="7720939" cy="5256000"/>
+          </a:xfrm>
+          <a:prstGeom prst="rect">
+            <a:avLst/>
+          </a:prstGeom>
+        </p:spPr>
+      </p:pic>
+    </p:spTree>
+    <p:extLst>
+      <p:ext uri="{BB962C8B-B14F-4D97-AF65-F5344CB8AC3E}">
+        <p14:creationId xmlns:p14="http://schemas.microsoft.com/office/powerpoint/2010/main" val="1937763912"/>
+      </p:ext>
+    </p:extLst>
+  </p:cSld>
+  <p:clrMapOvr>
+    <a:masterClrMapping/>
+  </p:clrMapOvr>
+</p:sld>
+</file>
+
+<file path=ppt/slides/slide9.xml><?xml version="1.0" encoding="utf-8"?>
+<p:sld xmlns:a="http://schemas.openxmlformats.org/drawingml/2006/main" xmlns:r="http://schemas.openxmlformats.org/officeDocument/2006/relationships" xmlns:p="http://schemas.openxmlformats.org/presentationml/2006/main">
+  <p:cSld>
+    <p:spTree>
+      <p:nvGrpSpPr>
+        <p:cNvPr id="1" name=""/>
+        <p:cNvGrpSpPr/>
+        <p:nvPr/>
+      </p:nvGrpSpPr>
+      <p:grpSpPr>
+        <a:xfrm>
+          <a:off x="0" y="0"/>
+          <a:ext cx="0" cy="0"/>
+          <a:chOff x="0" y="0"/>
+          <a:chExt cx="0" cy="0"/>
+        </a:xfrm>
+      </p:grpSpPr>
+      <p:sp>
+        <p:nvSpPr>
+          <p:cNvPr id="4" name="Rectangle 3">
+            <a:extLst>
+              <a:ext uri="{FF2B5EF4-FFF2-40B4-BE49-F238E27FC236}">
+                <a16:creationId xmlns:a16="http://schemas.microsoft.com/office/drawing/2014/main" id="{5F8FEC37-613F-1E6B-1866-202C2130A8B4}"/>
+              </a:ext>
+            </a:extLst>
+          </p:cNvPr>
+          <p:cNvSpPr/>
+          <p:nvPr/>
+        </p:nvSpPr>
+        <p:spPr>
+          <a:xfrm>
+            <a:off x="3267075" y="190500"/>
+            <a:ext cx="5829300" cy="914400"/>
+          </a:xfrm>
+          <a:prstGeom prst="rect">
+            <a:avLst/>
+          </a:prstGeom>
+          <a:noFill/>
+        </p:spPr>
+        <p:style>
+          <a:lnRef idx="2">
+            <a:schemeClr val="accent1">
+              <a:shade val="15000"/>
+            </a:schemeClr>
+          </a:lnRef>
+          <a:fillRef idx="1">
+            <a:schemeClr val="accent1"/>
+          </a:fillRef>
+          <a:effectRef idx="0">
+            <a:schemeClr val="accent1"/>
+          </a:effectRef>
+          <a:fontRef idx="minor">
+            <a:schemeClr val="lt1"/>
+          </a:fontRef>
+        </p:style>
+        <p:txBody>
+          <a:bodyPr rtlCol="0" anchor="ctr"/>
+          <a:lstStyle/>
+          <a:p>
+            <a:pPr algn="ctr"/>
+            <a:r>
+              <a:rPr lang="fr-FR" sz="2800" dirty="0">
+                <a:solidFill>
+                  <a:schemeClr val="tx1"/>
+                </a:solidFill>
+                <a:latin typeface="Calibri" panose="020F0502020204030204" pitchFamily="34" charset="0"/>
+                <a:cs typeface="Calibri" panose="020F0502020204030204" pitchFamily="34" charset="0"/>
+              </a:rPr>
+              <a:t>Meilleurs passeurs décisifs de 1998</a:t>
+            </a:r>
+          </a:p>
+        </p:txBody>
+      </p:sp>
+      <p:pic>
+        <p:nvPicPr>
+          <p:cNvPr id="6" name="Image 5">
+            <a:extLst>
+              <a:ext uri="{FF2B5EF4-FFF2-40B4-BE49-F238E27FC236}">
+                <a16:creationId xmlns:a16="http://schemas.microsoft.com/office/drawing/2014/main" id="{AC8646ED-23DF-1B6D-DBE9-42A823A80F50}"/>
+              </a:ext>
+            </a:extLst>
+          </p:cNvPr>
+          <p:cNvPicPr>
+            <a:picLocks noChangeAspect="1"/>
+          </p:cNvPicPr>
+          <p:nvPr/>
+        </p:nvPicPr>
+        <p:blipFill>
+          <a:blip r:embed="rId2"/>
+          <a:stretch>
+            <a:fillRect/>
+          </a:stretch>
+        </p:blipFill>
+        <p:spPr>
+          <a:xfrm>
+            <a:off x="1818640" y="1125220"/>
+            <a:ext cx="7957414" cy="5616000"/>
+          </a:xfrm>
+          <a:prstGeom prst="rect">
+            <a:avLst/>
+          </a:prstGeom>
+        </p:spPr>
+      </p:pic>
+    </p:spTree>
+    <p:extLst>
+      <p:ext uri="{BB962C8B-B14F-4D97-AF65-F5344CB8AC3E}">
+        <p14:creationId xmlns:p14="http://schemas.microsoft.com/office/powerpoint/2010/main" val="1995112621"/>
       </p:ext>
     </p:extLst>
   </p:cSld>

</xml_diff>